<commit_message>
Added basic metrics display.
</commit_message>
<xml_diff>
--- a/viewer/icons/icons.pptx
+++ b/viewer/icons/icons.pptx
@@ -6,6 +6,7 @@
   </p:sldMasterIdLst>
   <p:sldIdLst>
     <p:sldId id="257" r:id="rId2"/>
+    <p:sldId id="258" r:id="rId3"/>
   </p:sldIdLst>
   <p:sldSz cx="9144000" cy="6858000" type="screen4x3"/>
   <p:notesSz cx="6858000" cy="9144000"/>
@@ -3357,7 +3358,7 @@
             <a:graphicData uri="http://schemas.openxmlformats.org/presentationml/2006/ole">
               <mc:AlternateContent xmlns:mc="http://schemas.openxmlformats.org/markup-compatibility/2006">
                 <mc:Choice xmlns:v="urn:schemas-microsoft-com:vml" Requires="v">
-                  <p:oleObj spid="_x0000_s1027" name="Equation" r:id="rId3" imgW="215900" imgH="393700" progId="Equation.3">
+                  <p:oleObj spid="_x0000_s1031" name="Equation" r:id="rId3" imgW="215900" imgH="393700" progId="Equation.3">
                     <p:embed/>
                   </p:oleObj>
                 </mc:Choice>
@@ -3397,6 +3398,1812 @@
     <p:extLst>
       <p:ext uri="{BB962C8B-B14F-4D97-AF65-F5344CB8AC3E}">
         <p14:creationId xmlns:p14="http://schemas.microsoft.com/office/powerpoint/2010/main" val="2423119211"/>
+      </p:ext>
+    </p:extLst>
+  </p:cSld>
+  <p:clrMapOvr>
+    <a:masterClrMapping/>
+  </p:clrMapOvr>
+</p:sld>
+</file>
+
+<file path=ppt/slides/slide2.xml><?xml version="1.0" encoding="utf-8"?>
+<p:sld xmlns:a="http://schemas.openxmlformats.org/drawingml/2006/main" xmlns:r="http://schemas.openxmlformats.org/officeDocument/2006/relationships" xmlns:p="http://schemas.openxmlformats.org/presentationml/2006/main">
+  <p:cSld>
+    <p:spTree>
+      <p:nvGrpSpPr>
+        <p:cNvPr id="1" name=""/>
+        <p:cNvGrpSpPr/>
+        <p:nvPr/>
+      </p:nvGrpSpPr>
+      <p:grpSpPr>
+        <a:xfrm>
+          <a:off x="0" y="0"/>
+          <a:ext cx="0" cy="0"/>
+          <a:chOff x="0" y="0"/>
+          <a:chExt cx="0" cy="0"/>
+        </a:xfrm>
+      </p:grpSpPr>
+      <p:grpSp>
+        <p:nvGrpSpPr>
+          <p:cNvPr id="86" name="Group 85"/>
+          <p:cNvGrpSpPr/>
+          <p:nvPr/>
+        </p:nvGrpSpPr>
+        <p:grpSpPr>
+          <a:xfrm>
+            <a:off x="1613142" y="1384472"/>
+            <a:ext cx="2338888" cy="2336640"/>
+            <a:chOff x="1613142" y="1384472"/>
+            <a:chExt cx="2338888" cy="2336640"/>
+          </a:xfrm>
+        </p:grpSpPr>
+        <p:grpSp>
+          <p:nvGrpSpPr>
+            <p:cNvPr id="5" name="Group 4"/>
+            <p:cNvGrpSpPr/>
+            <p:nvPr/>
+          </p:nvGrpSpPr>
+          <p:grpSpPr>
+            <a:xfrm>
+              <a:off x="1613142" y="1384472"/>
+              <a:ext cx="2338888" cy="2336640"/>
+              <a:chOff x="1613142" y="1384472"/>
+              <a:chExt cx="2338888" cy="2336640"/>
+            </a:xfrm>
+          </p:grpSpPr>
+          <p:sp>
+            <p:nvSpPr>
+              <p:cNvPr id="11" name="Rounded Rectangle 10"/>
+              <p:cNvSpPr>
+                <a:spLocks noChangeAspect="1"/>
+              </p:cNvSpPr>
+              <p:nvPr/>
+            </p:nvSpPr>
+            <p:spPr>
+              <a:xfrm>
+                <a:off x="1613142" y="1384472"/>
+                <a:ext cx="2338888" cy="2336640"/>
+              </a:xfrm>
+              <a:prstGeom prst="roundRect">
+                <a:avLst/>
+              </a:prstGeom>
+              <a:solidFill>
+                <a:schemeClr val="accent1"/>
+              </a:solidFill>
+              <a:effectLst/>
+            </p:spPr>
+            <p:style>
+              <a:lnRef idx="1">
+                <a:schemeClr val="accent1"/>
+              </a:lnRef>
+              <a:fillRef idx="3">
+                <a:schemeClr val="accent1"/>
+              </a:fillRef>
+              <a:effectRef idx="2">
+                <a:schemeClr val="accent1"/>
+              </a:effectRef>
+              <a:fontRef idx="minor">
+                <a:schemeClr val="lt1"/>
+              </a:fontRef>
+            </p:style>
+            <p:txBody>
+              <a:bodyPr rtlCol="0" anchor="ctr"/>
+              <a:lstStyle/>
+              <a:p>
+                <a:pPr algn="ctr"/>
+                <a:endParaRPr lang="en-US"/>
+              </a:p>
+            </p:txBody>
+          </p:sp>
+          <p:sp>
+            <p:nvSpPr>
+              <p:cNvPr id="12" name="Rounded Rectangle 11"/>
+              <p:cNvSpPr>
+                <a:spLocks noChangeAspect="1"/>
+              </p:cNvSpPr>
+              <p:nvPr/>
+            </p:nvSpPr>
+            <p:spPr>
+              <a:xfrm>
+                <a:off x="1759590" y="1530776"/>
+                <a:ext cx="2045992" cy="2044032"/>
+              </a:xfrm>
+              <a:prstGeom prst="roundRect">
+                <a:avLst/>
+              </a:prstGeom>
+              <a:solidFill>
+                <a:schemeClr val="bg1"/>
+              </a:solidFill>
+              <a:effectLst/>
+            </p:spPr>
+            <p:style>
+              <a:lnRef idx="1">
+                <a:schemeClr val="accent1"/>
+              </a:lnRef>
+              <a:fillRef idx="3">
+                <a:schemeClr val="accent1"/>
+              </a:fillRef>
+              <a:effectRef idx="2">
+                <a:schemeClr val="accent1"/>
+              </a:effectRef>
+              <a:fontRef idx="minor">
+                <a:schemeClr val="lt1"/>
+              </a:fontRef>
+            </p:style>
+            <p:txBody>
+              <a:bodyPr rtlCol="0" anchor="ctr"/>
+              <a:lstStyle/>
+              <a:p>
+                <a:pPr algn="ctr"/>
+                <a:endParaRPr lang="en-US"/>
+              </a:p>
+            </p:txBody>
+          </p:sp>
+        </p:grpSp>
+        <p:grpSp>
+          <p:nvGrpSpPr>
+            <p:cNvPr id="84" name="Group 83"/>
+            <p:cNvGrpSpPr>
+              <a:grpSpLocks noChangeAspect="1"/>
+            </p:cNvGrpSpPr>
+            <p:nvPr/>
+          </p:nvGrpSpPr>
+          <p:grpSpPr>
+            <a:xfrm>
+              <a:off x="1812967" y="1748091"/>
+              <a:ext cx="538652" cy="1746099"/>
+              <a:chOff x="4352886" y="1762055"/>
+              <a:chExt cx="921608" cy="2987493"/>
+            </a:xfrm>
+          </p:grpSpPr>
+          <p:sp>
+            <p:nvSpPr>
+              <p:cNvPr id="13" name="Rectangle 12"/>
+              <p:cNvSpPr/>
+              <p:nvPr/>
+            </p:nvSpPr>
+            <p:spPr>
+              <a:xfrm>
+                <a:off x="4352886" y="1762055"/>
+                <a:ext cx="457629" cy="228839"/>
+              </a:xfrm>
+              <a:prstGeom prst="rect">
+                <a:avLst/>
+              </a:prstGeom>
+              <a:noFill/>
+              <a:ln>
+                <a:noFill/>
+              </a:ln>
+              <a:effectLst/>
+            </p:spPr>
+            <p:style>
+              <a:lnRef idx="1">
+                <a:schemeClr val="accent1"/>
+              </a:lnRef>
+              <a:fillRef idx="3">
+                <a:schemeClr val="accent1"/>
+              </a:fillRef>
+              <a:effectRef idx="2">
+                <a:schemeClr val="accent1"/>
+              </a:effectRef>
+              <a:fontRef idx="minor">
+                <a:schemeClr val="lt1"/>
+              </a:fontRef>
+            </p:style>
+            <p:txBody>
+              <a:bodyPr rtlCol="0" anchor="ctr"/>
+              <a:lstStyle/>
+              <a:p>
+                <a:pPr algn="ctr"/>
+                <a:endParaRPr lang="en-US"/>
+              </a:p>
+            </p:txBody>
+          </p:sp>
+          <p:sp>
+            <p:nvSpPr>
+              <p:cNvPr id="14" name="Rectangle 13"/>
+              <p:cNvSpPr/>
+              <p:nvPr/>
+            </p:nvSpPr>
+            <p:spPr>
+              <a:xfrm>
+                <a:off x="4816865" y="1762055"/>
+                <a:ext cx="457629" cy="228839"/>
+              </a:xfrm>
+              <a:prstGeom prst="rect">
+                <a:avLst/>
+              </a:prstGeom>
+              <a:noFill/>
+              <a:ln>
+                <a:noFill/>
+              </a:ln>
+              <a:effectLst/>
+            </p:spPr>
+            <p:style>
+              <a:lnRef idx="1">
+                <a:schemeClr val="accent1"/>
+              </a:lnRef>
+              <a:fillRef idx="3">
+                <a:schemeClr val="accent1"/>
+              </a:fillRef>
+              <a:effectRef idx="2">
+                <a:schemeClr val="accent1"/>
+              </a:effectRef>
+              <a:fontRef idx="minor">
+                <a:schemeClr val="lt1"/>
+              </a:fontRef>
+            </p:style>
+            <p:txBody>
+              <a:bodyPr rtlCol="0" anchor="ctr"/>
+              <a:lstStyle/>
+              <a:p>
+                <a:pPr algn="ctr"/>
+                <a:endParaRPr lang="en-US"/>
+              </a:p>
+            </p:txBody>
+          </p:sp>
+          <p:sp>
+            <p:nvSpPr>
+              <p:cNvPr id="15" name="Rectangle 14"/>
+              <p:cNvSpPr/>
+              <p:nvPr/>
+            </p:nvSpPr>
+            <p:spPr>
+              <a:xfrm>
+                <a:off x="4352886" y="1997174"/>
+                <a:ext cx="457629" cy="228839"/>
+              </a:xfrm>
+              <a:prstGeom prst="rect">
+                <a:avLst/>
+              </a:prstGeom>
+              <a:noFill/>
+              <a:ln>
+                <a:noFill/>
+              </a:ln>
+              <a:effectLst/>
+            </p:spPr>
+            <p:style>
+              <a:lnRef idx="1">
+                <a:schemeClr val="accent1"/>
+              </a:lnRef>
+              <a:fillRef idx="3">
+                <a:schemeClr val="accent1"/>
+              </a:fillRef>
+              <a:effectRef idx="2">
+                <a:schemeClr val="accent1"/>
+              </a:effectRef>
+              <a:fontRef idx="minor">
+                <a:schemeClr val="lt1"/>
+              </a:fontRef>
+            </p:style>
+            <p:txBody>
+              <a:bodyPr rtlCol="0" anchor="ctr"/>
+              <a:lstStyle/>
+              <a:p>
+                <a:pPr algn="ctr"/>
+                <a:endParaRPr lang="en-US"/>
+              </a:p>
+            </p:txBody>
+          </p:sp>
+          <p:sp>
+            <p:nvSpPr>
+              <p:cNvPr id="16" name="Rectangle 15"/>
+              <p:cNvSpPr/>
+              <p:nvPr/>
+            </p:nvSpPr>
+            <p:spPr>
+              <a:xfrm>
+                <a:off x="4816865" y="1997174"/>
+                <a:ext cx="231385" cy="228839"/>
+              </a:xfrm>
+              <a:prstGeom prst="rect">
+                <a:avLst/>
+              </a:prstGeom>
+              <a:noFill/>
+              <a:ln cap="rnd">
+                <a:noFill/>
+              </a:ln>
+              <a:effectLst/>
+            </p:spPr>
+            <p:style>
+              <a:lnRef idx="1">
+                <a:schemeClr val="accent1"/>
+              </a:lnRef>
+              <a:fillRef idx="3">
+                <a:schemeClr val="accent1"/>
+              </a:fillRef>
+              <a:effectRef idx="2">
+                <a:schemeClr val="accent1"/>
+              </a:effectRef>
+              <a:fontRef idx="minor">
+                <a:schemeClr val="lt1"/>
+              </a:fontRef>
+            </p:style>
+            <p:txBody>
+              <a:bodyPr rtlCol="0" anchor="ctr"/>
+              <a:lstStyle/>
+              <a:p>
+                <a:pPr algn="ctr"/>
+                <a:endParaRPr lang="en-US"/>
+              </a:p>
+            </p:txBody>
+          </p:sp>
+          <p:sp>
+            <p:nvSpPr>
+              <p:cNvPr id="17" name="Rectangle 16"/>
+              <p:cNvSpPr/>
+              <p:nvPr/>
+            </p:nvSpPr>
+            <p:spPr>
+              <a:xfrm>
+                <a:off x="4352886" y="2226351"/>
+                <a:ext cx="457629" cy="228839"/>
+              </a:xfrm>
+              <a:prstGeom prst="rect">
+                <a:avLst/>
+              </a:prstGeom>
+              <a:noFill/>
+              <a:ln>
+                <a:noFill/>
+              </a:ln>
+              <a:effectLst/>
+            </p:spPr>
+            <p:style>
+              <a:lnRef idx="1">
+                <a:schemeClr val="accent1"/>
+              </a:lnRef>
+              <a:fillRef idx="3">
+                <a:schemeClr val="accent1"/>
+              </a:fillRef>
+              <a:effectRef idx="2">
+                <a:schemeClr val="accent1"/>
+              </a:effectRef>
+              <a:fontRef idx="minor">
+                <a:schemeClr val="lt1"/>
+              </a:fontRef>
+            </p:style>
+            <p:txBody>
+              <a:bodyPr rtlCol="0" anchor="ctr"/>
+              <a:lstStyle/>
+              <a:p>
+                <a:pPr algn="ctr"/>
+                <a:endParaRPr lang="en-US"/>
+              </a:p>
+            </p:txBody>
+          </p:sp>
+          <p:sp>
+            <p:nvSpPr>
+              <p:cNvPr id="18" name="Rectangle 17"/>
+              <p:cNvSpPr/>
+              <p:nvPr/>
+            </p:nvSpPr>
+            <p:spPr>
+              <a:xfrm>
+                <a:off x="4816865" y="2226351"/>
+                <a:ext cx="231385" cy="228839"/>
+              </a:xfrm>
+              <a:prstGeom prst="rect">
+                <a:avLst/>
+              </a:prstGeom>
+              <a:noFill/>
+              <a:ln cap="rnd">
+                <a:noFill/>
+              </a:ln>
+              <a:effectLst/>
+            </p:spPr>
+            <p:style>
+              <a:lnRef idx="1">
+                <a:schemeClr val="accent1"/>
+              </a:lnRef>
+              <a:fillRef idx="3">
+                <a:schemeClr val="accent1"/>
+              </a:fillRef>
+              <a:effectRef idx="2">
+                <a:schemeClr val="accent1"/>
+              </a:effectRef>
+              <a:fontRef idx="minor">
+                <a:schemeClr val="lt1"/>
+              </a:fontRef>
+            </p:style>
+            <p:txBody>
+              <a:bodyPr rtlCol="0" anchor="ctr"/>
+              <a:lstStyle/>
+              <a:p>
+                <a:pPr algn="ctr"/>
+                <a:endParaRPr lang="en-US"/>
+              </a:p>
+            </p:txBody>
+          </p:sp>
+          <p:sp>
+            <p:nvSpPr>
+              <p:cNvPr id="19" name="Rectangle 18"/>
+              <p:cNvSpPr/>
+              <p:nvPr/>
+            </p:nvSpPr>
+            <p:spPr>
+              <a:xfrm>
+                <a:off x="4352886" y="2455190"/>
+                <a:ext cx="457629" cy="228839"/>
+              </a:xfrm>
+              <a:prstGeom prst="rect">
+                <a:avLst/>
+              </a:prstGeom>
+              <a:noFill/>
+              <a:ln>
+                <a:noFill/>
+              </a:ln>
+              <a:effectLst/>
+            </p:spPr>
+            <p:style>
+              <a:lnRef idx="1">
+                <a:schemeClr val="accent1"/>
+              </a:lnRef>
+              <a:fillRef idx="3">
+                <a:schemeClr val="accent1"/>
+              </a:fillRef>
+              <a:effectRef idx="2">
+                <a:schemeClr val="accent1"/>
+              </a:effectRef>
+              <a:fontRef idx="minor">
+                <a:schemeClr val="lt1"/>
+              </a:fontRef>
+            </p:style>
+            <p:txBody>
+              <a:bodyPr rtlCol="0" anchor="ctr"/>
+              <a:lstStyle/>
+              <a:p>
+                <a:pPr algn="ctr"/>
+                <a:endParaRPr lang="en-US"/>
+              </a:p>
+            </p:txBody>
+          </p:sp>
+          <p:sp>
+            <p:nvSpPr>
+              <p:cNvPr id="20" name="Rectangle 19"/>
+              <p:cNvSpPr/>
+              <p:nvPr/>
+            </p:nvSpPr>
+            <p:spPr>
+              <a:xfrm>
+                <a:off x="4816865" y="2455190"/>
+                <a:ext cx="457629" cy="228839"/>
+              </a:xfrm>
+              <a:prstGeom prst="rect">
+                <a:avLst/>
+              </a:prstGeom>
+              <a:noFill/>
+              <a:ln>
+                <a:noFill/>
+              </a:ln>
+              <a:effectLst/>
+            </p:spPr>
+            <p:style>
+              <a:lnRef idx="1">
+                <a:schemeClr val="accent1"/>
+              </a:lnRef>
+              <a:fillRef idx="3">
+                <a:schemeClr val="accent1"/>
+              </a:fillRef>
+              <a:effectRef idx="2">
+                <a:schemeClr val="accent1"/>
+              </a:effectRef>
+              <a:fontRef idx="minor">
+                <a:schemeClr val="lt1"/>
+              </a:fontRef>
+            </p:style>
+            <p:txBody>
+              <a:bodyPr rtlCol="0" anchor="ctr"/>
+              <a:lstStyle/>
+              <a:p>
+                <a:pPr algn="ctr"/>
+                <a:endParaRPr lang="en-US"/>
+              </a:p>
+            </p:txBody>
+          </p:sp>
+          <p:sp>
+            <p:nvSpPr>
+              <p:cNvPr id="21" name="Rectangle 20"/>
+              <p:cNvSpPr/>
+              <p:nvPr/>
+            </p:nvSpPr>
+            <p:spPr>
+              <a:xfrm>
+                <a:off x="4352886" y="2681769"/>
+                <a:ext cx="457629" cy="228839"/>
+              </a:xfrm>
+              <a:prstGeom prst="rect">
+                <a:avLst/>
+              </a:prstGeom>
+              <a:noFill/>
+              <a:ln>
+                <a:noFill/>
+              </a:ln>
+              <a:effectLst/>
+            </p:spPr>
+            <p:style>
+              <a:lnRef idx="1">
+                <a:schemeClr val="accent1"/>
+              </a:lnRef>
+              <a:fillRef idx="3">
+                <a:schemeClr val="accent1"/>
+              </a:fillRef>
+              <a:effectRef idx="2">
+                <a:schemeClr val="accent1"/>
+              </a:effectRef>
+              <a:fontRef idx="minor">
+                <a:schemeClr val="lt1"/>
+              </a:fontRef>
+            </p:style>
+            <p:txBody>
+              <a:bodyPr rtlCol="0" anchor="ctr"/>
+              <a:lstStyle/>
+              <a:p>
+                <a:pPr algn="ctr"/>
+                <a:endParaRPr lang="en-US"/>
+              </a:p>
+            </p:txBody>
+          </p:sp>
+          <p:sp>
+            <p:nvSpPr>
+              <p:cNvPr id="22" name="Rectangle 21"/>
+              <p:cNvSpPr/>
+              <p:nvPr/>
+            </p:nvSpPr>
+            <p:spPr>
+              <a:xfrm>
+                <a:off x="4816865" y="2681769"/>
+                <a:ext cx="231385" cy="228839"/>
+              </a:xfrm>
+              <a:prstGeom prst="rect">
+                <a:avLst/>
+              </a:prstGeom>
+              <a:noFill/>
+              <a:ln cap="rnd">
+                <a:noFill/>
+              </a:ln>
+              <a:effectLst/>
+            </p:spPr>
+            <p:style>
+              <a:lnRef idx="1">
+                <a:schemeClr val="accent1"/>
+              </a:lnRef>
+              <a:fillRef idx="3">
+                <a:schemeClr val="accent1"/>
+              </a:fillRef>
+              <a:effectRef idx="2">
+                <a:schemeClr val="accent1"/>
+              </a:effectRef>
+              <a:fontRef idx="minor">
+                <a:schemeClr val="lt1"/>
+              </a:fontRef>
+            </p:style>
+            <p:txBody>
+              <a:bodyPr rtlCol="0" anchor="ctr"/>
+              <a:lstStyle/>
+              <a:p>
+                <a:pPr algn="ctr"/>
+                <a:endParaRPr lang="en-US"/>
+              </a:p>
+            </p:txBody>
+          </p:sp>
+          <p:sp>
+            <p:nvSpPr>
+              <p:cNvPr id="23" name="Rectangle 22"/>
+              <p:cNvSpPr/>
+              <p:nvPr/>
+            </p:nvSpPr>
+            <p:spPr>
+              <a:xfrm>
+                <a:off x="4352886" y="2910946"/>
+                <a:ext cx="457629" cy="228839"/>
+              </a:xfrm>
+              <a:prstGeom prst="rect">
+                <a:avLst/>
+              </a:prstGeom>
+              <a:noFill/>
+              <a:ln>
+                <a:noFill/>
+              </a:ln>
+              <a:effectLst/>
+            </p:spPr>
+            <p:style>
+              <a:lnRef idx="1">
+                <a:schemeClr val="accent1"/>
+              </a:lnRef>
+              <a:fillRef idx="3">
+                <a:schemeClr val="accent1"/>
+              </a:fillRef>
+              <a:effectRef idx="2">
+                <a:schemeClr val="accent1"/>
+              </a:effectRef>
+              <a:fontRef idx="minor">
+                <a:schemeClr val="lt1"/>
+              </a:fontRef>
+            </p:style>
+            <p:txBody>
+              <a:bodyPr rtlCol="0" anchor="ctr"/>
+              <a:lstStyle/>
+              <a:p>
+                <a:pPr algn="ctr"/>
+                <a:endParaRPr lang="en-US"/>
+              </a:p>
+            </p:txBody>
+          </p:sp>
+          <p:sp>
+            <p:nvSpPr>
+              <p:cNvPr id="24" name="Rectangle 23"/>
+              <p:cNvSpPr/>
+              <p:nvPr/>
+            </p:nvSpPr>
+            <p:spPr>
+              <a:xfrm>
+                <a:off x="4816865" y="2910946"/>
+                <a:ext cx="231385" cy="228839"/>
+              </a:xfrm>
+              <a:prstGeom prst="rect">
+                <a:avLst/>
+              </a:prstGeom>
+              <a:noFill/>
+              <a:ln cap="rnd">
+                <a:noFill/>
+              </a:ln>
+              <a:effectLst/>
+            </p:spPr>
+            <p:style>
+              <a:lnRef idx="1">
+                <a:schemeClr val="accent1"/>
+              </a:lnRef>
+              <a:fillRef idx="3">
+                <a:schemeClr val="accent1"/>
+              </a:fillRef>
+              <a:effectRef idx="2">
+                <a:schemeClr val="accent1"/>
+              </a:effectRef>
+              <a:fontRef idx="minor">
+                <a:schemeClr val="lt1"/>
+              </a:fontRef>
+            </p:style>
+            <p:txBody>
+              <a:bodyPr rtlCol="0" anchor="ctr"/>
+              <a:lstStyle/>
+              <a:p>
+                <a:pPr algn="ctr"/>
+                <a:endParaRPr lang="en-US"/>
+              </a:p>
+            </p:txBody>
+          </p:sp>
+          <p:sp>
+            <p:nvSpPr>
+              <p:cNvPr id="25" name="Rectangle 24"/>
+              <p:cNvSpPr/>
+              <p:nvPr/>
+            </p:nvSpPr>
+            <p:spPr>
+              <a:xfrm>
+                <a:off x="4352886" y="3139785"/>
+                <a:ext cx="457629" cy="228839"/>
+              </a:xfrm>
+              <a:prstGeom prst="rect">
+                <a:avLst/>
+              </a:prstGeom>
+              <a:noFill/>
+              <a:ln>
+                <a:noFill/>
+              </a:ln>
+              <a:effectLst/>
+            </p:spPr>
+            <p:style>
+              <a:lnRef idx="1">
+                <a:schemeClr val="accent1"/>
+              </a:lnRef>
+              <a:fillRef idx="3">
+                <a:schemeClr val="accent1"/>
+              </a:fillRef>
+              <a:effectRef idx="2">
+                <a:schemeClr val="accent1"/>
+              </a:effectRef>
+              <a:fontRef idx="minor">
+                <a:schemeClr val="lt1"/>
+              </a:fontRef>
+            </p:style>
+            <p:txBody>
+              <a:bodyPr rtlCol="0" anchor="ctr"/>
+              <a:lstStyle/>
+              <a:p>
+                <a:pPr algn="ctr"/>
+                <a:endParaRPr lang="en-US"/>
+              </a:p>
+            </p:txBody>
+          </p:sp>
+          <p:sp>
+            <p:nvSpPr>
+              <p:cNvPr id="26" name="Rectangle 25"/>
+              <p:cNvSpPr/>
+              <p:nvPr/>
+            </p:nvSpPr>
+            <p:spPr>
+              <a:xfrm>
+                <a:off x="4816865" y="3139785"/>
+                <a:ext cx="457629" cy="228839"/>
+              </a:xfrm>
+              <a:prstGeom prst="rect">
+                <a:avLst/>
+              </a:prstGeom>
+              <a:noFill/>
+              <a:ln>
+                <a:noFill/>
+              </a:ln>
+              <a:effectLst/>
+            </p:spPr>
+            <p:style>
+              <a:lnRef idx="1">
+                <a:schemeClr val="accent1"/>
+              </a:lnRef>
+              <a:fillRef idx="3">
+                <a:schemeClr val="accent1"/>
+              </a:fillRef>
+              <a:effectRef idx="2">
+                <a:schemeClr val="accent1"/>
+              </a:effectRef>
+              <a:fontRef idx="minor">
+                <a:schemeClr val="lt1"/>
+              </a:fontRef>
+            </p:style>
+            <p:txBody>
+              <a:bodyPr rtlCol="0" anchor="ctr"/>
+              <a:lstStyle/>
+              <a:p>
+                <a:pPr algn="ctr"/>
+                <a:endParaRPr lang="en-US"/>
+              </a:p>
+            </p:txBody>
+          </p:sp>
+          <p:sp>
+            <p:nvSpPr>
+              <p:cNvPr id="27" name="Rectangle 26"/>
+              <p:cNvSpPr/>
+              <p:nvPr/>
+            </p:nvSpPr>
+            <p:spPr>
+              <a:xfrm>
+                <a:off x="4352886" y="3378098"/>
+                <a:ext cx="457629" cy="228839"/>
+              </a:xfrm>
+              <a:prstGeom prst="rect">
+                <a:avLst/>
+              </a:prstGeom>
+              <a:noFill/>
+              <a:ln>
+                <a:noFill/>
+              </a:ln>
+              <a:effectLst/>
+            </p:spPr>
+            <p:style>
+              <a:lnRef idx="1">
+                <a:schemeClr val="accent1"/>
+              </a:lnRef>
+              <a:fillRef idx="3">
+                <a:schemeClr val="accent1"/>
+              </a:fillRef>
+              <a:effectRef idx="2">
+                <a:schemeClr val="accent1"/>
+              </a:effectRef>
+              <a:fontRef idx="minor">
+                <a:schemeClr val="lt1"/>
+              </a:fontRef>
+            </p:style>
+            <p:txBody>
+              <a:bodyPr rtlCol="0" anchor="ctr"/>
+              <a:lstStyle/>
+              <a:p>
+                <a:pPr algn="ctr"/>
+                <a:endParaRPr lang="en-US"/>
+              </a:p>
+            </p:txBody>
+          </p:sp>
+          <p:sp>
+            <p:nvSpPr>
+              <p:cNvPr id="28" name="Rectangle 27"/>
+              <p:cNvSpPr/>
+              <p:nvPr/>
+            </p:nvSpPr>
+            <p:spPr>
+              <a:xfrm>
+                <a:off x="4816865" y="3378098"/>
+                <a:ext cx="231385" cy="228839"/>
+              </a:xfrm>
+              <a:prstGeom prst="rect">
+                <a:avLst/>
+              </a:prstGeom>
+              <a:noFill/>
+              <a:ln cap="rnd">
+                <a:noFill/>
+              </a:ln>
+              <a:effectLst/>
+            </p:spPr>
+            <p:style>
+              <a:lnRef idx="1">
+                <a:schemeClr val="accent1"/>
+              </a:lnRef>
+              <a:fillRef idx="3">
+                <a:schemeClr val="accent1"/>
+              </a:fillRef>
+              <a:effectRef idx="2">
+                <a:schemeClr val="accent1"/>
+              </a:effectRef>
+              <a:fontRef idx="minor">
+                <a:schemeClr val="lt1"/>
+              </a:fontRef>
+            </p:style>
+            <p:txBody>
+              <a:bodyPr rtlCol="0" anchor="ctr"/>
+              <a:lstStyle/>
+              <a:p>
+                <a:pPr algn="ctr"/>
+                <a:endParaRPr lang="en-US"/>
+              </a:p>
+            </p:txBody>
+          </p:sp>
+          <p:sp>
+            <p:nvSpPr>
+              <p:cNvPr id="29" name="Rectangle 28"/>
+              <p:cNvSpPr/>
+              <p:nvPr/>
+            </p:nvSpPr>
+            <p:spPr>
+              <a:xfrm>
+                <a:off x="4352886" y="3607275"/>
+                <a:ext cx="457629" cy="228839"/>
+              </a:xfrm>
+              <a:prstGeom prst="rect">
+                <a:avLst/>
+              </a:prstGeom>
+              <a:noFill/>
+              <a:ln>
+                <a:noFill/>
+              </a:ln>
+              <a:effectLst/>
+            </p:spPr>
+            <p:style>
+              <a:lnRef idx="1">
+                <a:schemeClr val="accent1"/>
+              </a:lnRef>
+              <a:fillRef idx="3">
+                <a:schemeClr val="accent1"/>
+              </a:fillRef>
+              <a:effectRef idx="2">
+                <a:schemeClr val="accent1"/>
+              </a:effectRef>
+              <a:fontRef idx="minor">
+                <a:schemeClr val="lt1"/>
+              </a:fontRef>
+            </p:style>
+            <p:txBody>
+              <a:bodyPr rtlCol="0" anchor="ctr"/>
+              <a:lstStyle/>
+              <a:p>
+                <a:pPr algn="ctr"/>
+                <a:endParaRPr lang="en-US"/>
+              </a:p>
+            </p:txBody>
+          </p:sp>
+          <p:sp>
+            <p:nvSpPr>
+              <p:cNvPr id="30" name="Rectangle 29"/>
+              <p:cNvSpPr/>
+              <p:nvPr/>
+            </p:nvSpPr>
+            <p:spPr>
+              <a:xfrm>
+                <a:off x="4816865" y="3607275"/>
+                <a:ext cx="231385" cy="228839"/>
+              </a:xfrm>
+              <a:prstGeom prst="rect">
+                <a:avLst/>
+              </a:prstGeom>
+              <a:noFill/>
+              <a:ln cap="rnd">
+                <a:noFill/>
+              </a:ln>
+              <a:effectLst/>
+            </p:spPr>
+            <p:style>
+              <a:lnRef idx="1">
+                <a:schemeClr val="accent1"/>
+              </a:lnRef>
+              <a:fillRef idx="3">
+                <a:schemeClr val="accent1"/>
+              </a:fillRef>
+              <a:effectRef idx="2">
+                <a:schemeClr val="accent1"/>
+              </a:effectRef>
+              <a:fontRef idx="minor">
+                <a:schemeClr val="lt1"/>
+              </a:fontRef>
+            </p:style>
+            <p:txBody>
+              <a:bodyPr rtlCol="0" anchor="ctr"/>
+              <a:lstStyle/>
+              <a:p>
+                <a:pPr algn="ctr"/>
+                <a:endParaRPr lang="en-US"/>
+              </a:p>
+            </p:txBody>
+          </p:sp>
+          <p:sp>
+            <p:nvSpPr>
+              <p:cNvPr id="31" name="Rectangle 30"/>
+              <p:cNvSpPr/>
+              <p:nvPr/>
+            </p:nvSpPr>
+            <p:spPr>
+              <a:xfrm>
+                <a:off x="4352886" y="3836114"/>
+                <a:ext cx="457629" cy="228839"/>
+              </a:xfrm>
+              <a:prstGeom prst="rect">
+                <a:avLst/>
+              </a:prstGeom>
+              <a:noFill/>
+              <a:ln>
+                <a:noFill/>
+              </a:ln>
+              <a:effectLst/>
+            </p:spPr>
+            <p:style>
+              <a:lnRef idx="1">
+                <a:schemeClr val="accent1"/>
+              </a:lnRef>
+              <a:fillRef idx="3">
+                <a:schemeClr val="accent1"/>
+              </a:fillRef>
+              <a:effectRef idx="2">
+                <a:schemeClr val="accent1"/>
+              </a:effectRef>
+              <a:fontRef idx="minor">
+                <a:schemeClr val="lt1"/>
+              </a:fontRef>
+            </p:style>
+            <p:txBody>
+              <a:bodyPr rtlCol="0" anchor="ctr"/>
+              <a:lstStyle/>
+              <a:p>
+                <a:pPr algn="ctr"/>
+                <a:endParaRPr lang="en-US"/>
+              </a:p>
+            </p:txBody>
+          </p:sp>
+          <p:sp>
+            <p:nvSpPr>
+              <p:cNvPr id="32" name="Rectangle 31"/>
+              <p:cNvSpPr/>
+              <p:nvPr/>
+            </p:nvSpPr>
+            <p:spPr>
+              <a:xfrm>
+                <a:off x="4816865" y="3836114"/>
+                <a:ext cx="457629" cy="228839"/>
+              </a:xfrm>
+              <a:prstGeom prst="rect">
+                <a:avLst/>
+              </a:prstGeom>
+              <a:noFill/>
+              <a:ln>
+                <a:noFill/>
+              </a:ln>
+              <a:effectLst/>
+            </p:spPr>
+            <p:style>
+              <a:lnRef idx="1">
+                <a:schemeClr val="accent1"/>
+              </a:lnRef>
+              <a:fillRef idx="3">
+                <a:schemeClr val="accent1"/>
+              </a:fillRef>
+              <a:effectRef idx="2">
+                <a:schemeClr val="accent1"/>
+              </a:effectRef>
+              <a:fontRef idx="minor">
+                <a:schemeClr val="lt1"/>
+              </a:fontRef>
+            </p:style>
+            <p:txBody>
+              <a:bodyPr rtlCol="0" anchor="ctr"/>
+              <a:lstStyle/>
+              <a:p>
+                <a:pPr algn="ctr"/>
+                <a:endParaRPr lang="en-US"/>
+              </a:p>
+            </p:txBody>
+          </p:sp>
+          <p:sp>
+            <p:nvSpPr>
+              <p:cNvPr id="33" name="Rectangle 32"/>
+              <p:cNvSpPr/>
+              <p:nvPr/>
+            </p:nvSpPr>
+            <p:spPr>
+              <a:xfrm>
+                <a:off x="4352886" y="4062693"/>
+                <a:ext cx="457629" cy="228839"/>
+              </a:xfrm>
+              <a:prstGeom prst="rect">
+                <a:avLst/>
+              </a:prstGeom>
+              <a:noFill/>
+              <a:ln>
+                <a:noFill/>
+              </a:ln>
+              <a:effectLst/>
+            </p:spPr>
+            <p:style>
+              <a:lnRef idx="1">
+                <a:schemeClr val="accent1"/>
+              </a:lnRef>
+              <a:fillRef idx="3">
+                <a:schemeClr val="accent1"/>
+              </a:fillRef>
+              <a:effectRef idx="2">
+                <a:schemeClr val="accent1"/>
+              </a:effectRef>
+              <a:fontRef idx="minor">
+                <a:schemeClr val="lt1"/>
+              </a:fontRef>
+            </p:style>
+            <p:txBody>
+              <a:bodyPr rtlCol="0" anchor="ctr"/>
+              <a:lstStyle/>
+              <a:p>
+                <a:pPr algn="ctr"/>
+                <a:endParaRPr lang="en-US"/>
+              </a:p>
+            </p:txBody>
+          </p:sp>
+          <p:sp>
+            <p:nvSpPr>
+              <p:cNvPr id="34" name="Rectangle 33"/>
+              <p:cNvSpPr/>
+              <p:nvPr/>
+            </p:nvSpPr>
+            <p:spPr>
+              <a:xfrm>
+                <a:off x="4816865" y="4062693"/>
+                <a:ext cx="231385" cy="228839"/>
+              </a:xfrm>
+              <a:prstGeom prst="rect">
+                <a:avLst/>
+              </a:prstGeom>
+              <a:noFill/>
+              <a:ln cap="rnd">
+                <a:noFill/>
+              </a:ln>
+              <a:effectLst/>
+            </p:spPr>
+            <p:style>
+              <a:lnRef idx="1">
+                <a:schemeClr val="accent1"/>
+              </a:lnRef>
+              <a:fillRef idx="3">
+                <a:schemeClr val="accent1"/>
+              </a:fillRef>
+              <a:effectRef idx="2">
+                <a:schemeClr val="accent1"/>
+              </a:effectRef>
+              <a:fontRef idx="minor">
+                <a:schemeClr val="lt1"/>
+              </a:fontRef>
+            </p:style>
+            <p:txBody>
+              <a:bodyPr rtlCol="0" anchor="ctr"/>
+              <a:lstStyle/>
+              <a:p>
+                <a:pPr algn="ctr"/>
+                <a:endParaRPr lang="en-US"/>
+              </a:p>
+            </p:txBody>
+          </p:sp>
+          <p:sp>
+            <p:nvSpPr>
+              <p:cNvPr id="35" name="Rectangle 34"/>
+              <p:cNvSpPr/>
+              <p:nvPr/>
+            </p:nvSpPr>
+            <p:spPr>
+              <a:xfrm>
+                <a:off x="4352886" y="4291870"/>
+                <a:ext cx="457629" cy="228839"/>
+              </a:xfrm>
+              <a:prstGeom prst="rect">
+                <a:avLst/>
+              </a:prstGeom>
+              <a:noFill/>
+              <a:ln>
+                <a:noFill/>
+              </a:ln>
+              <a:effectLst/>
+            </p:spPr>
+            <p:style>
+              <a:lnRef idx="1">
+                <a:schemeClr val="accent1"/>
+              </a:lnRef>
+              <a:fillRef idx="3">
+                <a:schemeClr val="accent1"/>
+              </a:fillRef>
+              <a:effectRef idx="2">
+                <a:schemeClr val="accent1"/>
+              </a:effectRef>
+              <a:fontRef idx="minor">
+                <a:schemeClr val="lt1"/>
+              </a:fontRef>
+            </p:style>
+            <p:txBody>
+              <a:bodyPr rtlCol="0" anchor="ctr"/>
+              <a:lstStyle/>
+              <a:p>
+                <a:pPr algn="ctr"/>
+                <a:endParaRPr lang="en-US"/>
+              </a:p>
+            </p:txBody>
+          </p:sp>
+          <p:sp>
+            <p:nvSpPr>
+              <p:cNvPr id="36" name="Rectangle 35"/>
+              <p:cNvSpPr/>
+              <p:nvPr/>
+            </p:nvSpPr>
+            <p:spPr>
+              <a:xfrm>
+                <a:off x="4816865" y="4291870"/>
+                <a:ext cx="231385" cy="228839"/>
+              </a:xfrm>
+              <a:prstGeom prst="rect">
+                <a:avLst/>
+              </a:prstGeom>
+              <a:noFill/>
+              <a:ln cap="rnd">
+                <a:noFill/>
+              </a:ln>
+              <a:effectLst/>
+            </p:spPr>
+            <p:style>
+              <a:lnRef idx="1">
+                <a:schemeClr val="accent1"/>
+              </a:lnRef>
+              <a:fillRef idx="3">
+                <a:schemeClr val="accent1"/>
+              </a:fillRef>
+              <a:effectRef idx="2">
+                <a:schemeClr val="accent1"/>
+              </a:effectRef>
+              <a:fontRef idx="minor">
+                <a:schemeClr val="lt1"/>
+              </a:fontRef>
+            </p:style>
+            <p:txBody>
+              <a:bodyPr rtlCol="0" anchor="ctr"/>
+              <a:lstStyle/>
+              <a:p>
+                <a:pPr algn="ctr"/>
+                <a:endParaRPr lang="en-US"/>
+              </a:p>
+            </p:txBody>
+          </p:sp>
+          <p:sp>
+            <p:nvSpPr>
+              <p:cNvPr id="37" name="Rectangle 36"/>
+              <p:cNvSpPr/>
+              <p:nvPr/>
+            </p:nvSpPr>
+            <p:spPr>
+              <a:xfrm>
+                <a:off x="4352886" y="4520709"/>
+                <a:ext cx="457629" cy="228839"/>
+              </a:xfrm>
+              <a:prstGeom prst="rect">
+                <a:avLst/>
+              </a:prstGeom>
+              <a:noFill/>
+              <a:ln>
+                <a:noFill/>
+              </a:ln>
+              <a:effectLst/>
+            </p:spPr>
+            <p:style>
+              <a:lnRef idx="1">
+                <a:schemeClr val="accent1"/>
+              </a:lnRef>
+              <a:fillRef idx="3">
+                <a:schemeClr val="accent1"/>
+              </a:fillRef>
+              <a:effectRef idx="2">
+                <a:schemeClr val="accent1"/>
+              </a:effectRef>
+              <a:fontRef idx="minor">
+                <a:schemeClr val="lt1"/>
+              </a:fontRef>
+            </p:style>
+            <p:txBody>
+              <a:bodyPr rtlCol="0" anchor="ctr"/>
+              <a:lstStyle/>
+              <a:p>
+                <a:pPr algn="ctr"/>
+                <a:endParaRPr lang="en-US"/>
+              </a:p>
+            </p:txBody>
+          </p:sp>
+          <p:sp>
+            <p:nvSpPr>
+              <p:cNvPr id="38" name="Rectangle 37"/>
+              <p:cNvSpPr/>
+              <p:nvPr/>
+            </p:nvSpPr>
+            <p:spPr>
+              <a:xfrm>
+                <a:off x="4816865" y="4520709"/>
+                <a:ext cx="457629" cy="228839"/>
+              </a:xfrm>
+              <a:prstGeom prst="rect">
+                <a:avLst/>
+              </a:prstGeom>
+              <a:noFill/>
+              <a:ln>
+                <a:noFill/>
+              </a:ln>
+              <a:effectLst/>
+            </p:spPr>
+            <p:style>
+              <a:lnRef idx="1">
+                <a:schemeClr val="accent1"/>
+              </a:lnRef>
+              <a:fillRef idx="3">
+                <a:schemeClr val="accent1"/>
+              </a:fillRef>
+              <a:effectRef idx="2">
+                <a:schemeClr val="accent1"/>
+              </a:effectRef>
+              <a:fontRef idx="minor">
+                <a:schemeClr val="lt1"/>
+              </a:fontRef>
+            </p:style>
+            <p:txBody>
+              <a:bodyPr rtlCol="0" anchor="ctr"/>
+              <a:lstStyle/>
+              <a:p>
+                <a:pPr algn="ctr"/>
+                <a:endParaRPr lang="en-US"/>
+              </a:p>
+            </p:txBody>
+          </p:sp>
+          <p:cxnSp>
+            <p:nvCxnSpPr>
+              <p:cNvPr id="42" name="Straight Connector 41"/>
+              <p:cNvCxnSpPr>
+                <a:stCxn id="13" idx="0"/>
+                <a:endCxn id="14" idx="0"/>
+              </p:cNvCxnSpPr>
+              <p:nvPr/>
+            </p:nvCxnSpPr>
+            <p:spPr>
+              <a:xfrm>
+                <a:off x="4581701" y="1762055"/>
+                <a:ext cx="463979" cy="0"/>
+              </a:xfrm>
+              <a:prstGeom prst="line">
+                <a:avLst/>
+              </a:prstGeom>
+              <a:ln cap="rnd"/>
+              <a:effectLst/>
+            </p:spPr>
+            <p:style>
+              <a:lnRef idx="2">
+                <a:schemeClr val="accent1"/>
+              </a:lnRef>
+              <a:fillRef idx="0">
+                <a:schemeClr val="accent1"/>
+              </a:fillRef>
+              <a:effectRef idx="1">
+                <a:schemeClr val="accent1"/>
+              </a:effectRef>
+              <a:fontRef idx="minor">
+                <a:schemeClr val="tx1"/>
+              </a:fontRef>
+            </p:style>
+          </p:cxnSp>
+          <p:cxnSp>
+            <p:nvCxnSpPr>
+              <p:cNvPr id="43" name="Straight Connector 42"/>
+              <p:cNvCxnSpPr>
+                <a:stCxn id="13" idx="0"/>
+                <a:endCxn id="35" idx="2"/>
+              </p:cNvCxnSpPr>
+              <p:nvPr/>
+            </p:nvCxnSpPr>
+            <p:spPr>
+              <a:xfrm>
+                <a:off x="4581701" y="1762055"/>
+                <a:ext cx="0" cy="2758654"/>
+              </a:xfrm>
+              <a:prstGeom prst="line">
+                <a:avLst/>
+              </a:prstGeom>
+              <a:ln cap="rnd"/>
+              <a:effectLst/>
+            </p:spPr>
+            <p:style>
+              <a:lnRef idx="2">
+                <a:schemeClr val="accent1"/>
+              </a:lnRef>
+              <a:fillRef idx="0">
+                <a:schemeClr val="accent1"/>
+              </a:fillRef>
+              <a:effectRef idx="1">
+                <a:schemeClr val="accent1"/>
+              </a:effectRef>
+              <a:fontRef idx="minor">
+                <a:schemeClr val="tx1"/>
+              </a:fontRef>
+            </p:style>
+          </p:cxnSp>
+          <p:cxnSp>
+            <p:nvCxnSpPr>
+              <p:cNvPr id="46" name="Straight Connector 45"/>
+              <p:cNvCxnSpPr>
+                <a:stCxn id="37" idx="0"/>
+                <a:endCxn id="38" idx="0"/>
+              </p:cNvCxnSpPr>
+              <p:nvPr/>
+            </p:nvCxnSpPr>
+            <p:spPr>
+              <a:xfrm>
+                <a:off x="4581701" y="4520709"/>
+                <a:ext cx="463979" cy="0"/>
+              </a:xfrm>
+              <a:prstGeom prst="line">
+                <a:avLst/>
+              </a:prstGeom>
+              <a:ln cap="rnd"/>
+              <a:effectLst/>
+            </p:spPr>
+            <p:style>
+              <a:lnRef idx="2">
+                <a:schemeClr val="accent1"/>
+              </a:lnRef>
+              <a:fillRef idx="0">
+                <a:schemeClr val="accent1"/>
+              </a:fillRef>
+              <a:effectRef idx="1">
+                <a:schemeClr val="accent1"/>
+              </a:effectRef>
+              <a:fontRef idx="minor">
+                <a:schemeClr val="tx1"/>
+              </a:fontRef>
+            </p:style>
+          </p:cxnSp>
+          <p:cxnSp>
+            <p:nvCxnSpPr>
+              <p:cNvPr id="49" name="Straight Connector 48"/>
+              <p:cNvCxnSpPr>
+                <a:stCxn id="13" idx="2"/>
+                <a:endCxn id="16" idx="0"/>
+              </p:cNvCxnSpPr>
+              <p:nvPr/>
+            </p:nvCxnSpPr>
+            <p:spPr>
+              <a:xfrm>
+                <a:off x="4581701" y="1990894"/>
+                <a:ext cx="350857" cy="6280"/>
+              </a:xfrm>
+              <a:prstGeom prst="line">
+                <a:avLst/>
+              </a:prstGeom>
+              <a:ln cap="rnd"/>
+              <a:effectLst/>
+            </p:spPr>
+            <p:style>
+              <a:lnRef idx="2">
+                <a:schemeClr val="accent1"/>
+              </a:lnRef>
+              <a:fillRef idx="0">
+                <a:schemeClr val="accent1"/>
+              </a:fillRef>
+              <a:effectRef idx="1">
+                <a:schemeClr val="accent1"/>
+              </a:effectRef>
+              <a:fontRef idx="minor">
+                <a:schemeClr val="tx1"/>
+              </a:fontRef>
+            </p:style>
+          </p:cxnSp>
+          <p:cxnSp>
+            <p:nvCxnSpPr>
+              <p:cNvPr id="52" name="Straight Connector 51"/>
+              <p:cNvCxnSpPr>
+                <a:stCxn id="15" idx="2"/>
+                <a:endCxn id="16" idx="2"/>
+              </p:cNvCxnSpPr>
+              <p:nvPr/>
+            </p:nvCxnSpPr>
+            <p:spPr>
+              <a:xfrm>
+                <a:off x="4581701" y="2226013"/>
+                <a:ext cx="350857" cy="0"/>
+              </a:xfrm>
+              <a:prstGeom prst="line">
+                <a:avLst/>
+              </a:prstGeom>
+              <a:ln cap="rnd"/>
+              <a:effectLst/>
+            </p:spPr>
+            <p:style>
+              <a:lnRef idx="2">
+                <a:schemeClr val="accent1"/>
+              </a:lnRef>
+              <a:fillRef idx="0">
+                <a:schemeClr val="accent1"/>
+              </a:fillRef>
+              <a:effectRef idx="1">
+                <a:schemeClr val="accent1"/>
+              </a:effectRef>
+              <a:fontRef idx="minor">
+                <a:schemeClr val="tx1"/>
+              </a:fontRef>
+            </p:style>
+          </p:cxnSp>
+          <p:cxnSp>
+            <p:nvCxnSpPr>
+              <p:cNvPr id="55" name="Straight Connector 54"/>
+              <p:cNvCxnSpPr>
+                <a:stCxn id="17" idx="2"/>
+                <a:endCxn id="20" idx="0"/>
+              </p:cNvCxnSpPr>
+              <p:nvPr/>
+            </p:nvCxnSpPr>
+            <p:spPr>
+              <a:xfrm>
+                <a:off x="4581701" y="2455190"/>
+                <a:ext cx="463979" cy="0"/>
+              </a:xfrm>
+              <a:prstGeom prst="line">
+                <a:avLst/>
+              </a:prstGeom>
+              <a:ln cap="rnd"/>
+              <a:effectLst/>
+            </p:spPr>
+            <p:style>
+              <a:lnRef idx="2">
+                <a:schemeClr val="accent1"/>
+              </a:lnRef>
+              <a:fillRef idx="0">
+                <a:schemeClr val="accent1"/>
+              </a:fillRef>
+              <a:effectRef idx="1">
+                <a:schemeClr val="accent1"/>
+              </a:effectRef>
+              <a:fontRef idx="minor">
+                <a:schemeClr val="tx1"/>
+              </a:fontRef>
+            </p:style>
+          </p:cxnSp>
+          <p:cxnSp>
+            <p:nvCxnSpPr>
+              <p:cNvPr id="58" name="Straight Connector 57"/>
+              <p:cNvCxnSpPr>
+                <a:stCxn id="21" idx="0"/>
+                <a:endCxn id="22" idx="0"/>
+              </p:cNvCxnSpPr>
+              <p:nvPr/>
+            </p:nvCxnSpPr>
+            <p:spPr>
+              <a:xfrm>
+                <a:off x="4581701" y="2681769"/>
+                <a:ext cx="350857" cy="0"/>
+              </a:xfrm>
+              <a:prstGeom prst="line">
+                <a:avLst/>
+              </a:prstGeom>
+              <a:ln cap="rnd"/>
+              <a:effectLst/>
+            </p:spPr>
+            <p:style>
+              <a:lnRef idx="2">
+                <a:schemeClr val="accent1"/>
+              </a:lnRef>
+              <a:fillRef idx="0">
+                <a:schemeClr val="accent1"/>
+              </a:fillRef>
+              <a:effectRef idx="1">
+                <a:schemeClr val="accent1"/>
+              </a:effectRef>
+              <a:fontRef idx="minor">
+                <a:schemeClr val="tx1"/>
+              </a:fontRef>
+            </p:style>
+          </p:cxnSp>
+          <p:cxnSp>
+            <p:nvCxnSpPr>
+              <p:cNvPr id="61" name="Straight Connector 60"/>
+              <p:cNvCxnSpPr>
+                <a:stCxn id="21" idx="2"/>
+                <a:endCxn id="22" idx="2"/>
+              </p:cNvCxnSpPr>
+              <p:nvPr/>
+            </p:nvCxnSpPr>
+            <p:spPr>
+              <a:xfrm>
+                <a:off x="4581701" y="2910608"/>
+                <a:ext cx="350857" cy="0"/>
+              </a:xfrm>
+              <a:prstGeom prst="line">
+                <a:avLst/>
+              </a:prstGeom>
+              <a:ln cap="rnd"/>
+              <a:effectLst/>
+            </p:spPr>
+            <p:style>
+              <a:lnRef idx="2">
+                <a:schemeClr val="accent1"/>
+              </a:lnRef>
+              <a:fillRef idx="0">
+                <a:schemeClr val="accent1"/>
+              </a:fillRef>
+              <a:effectRef idx="1">
+                <a:schemeClr val="accent1"/>
+              </a:effectRef>
+              <a:fontRef idx="minor">
+                <a:schemeClr val="tx1"/>
+              </a:fontRef>
+            </p:style>
+          </p:cxnSp>
+          <p:cxnSp>
+            <p:nvCxnSpPr>
+              <p:cNvPr id="64" name="Straight Connector 63"/>
+              <p:cNvCxnSpPr>
+                <a:stCxn id="23" idx="2"/>
+                <a:endCxn id="26" idx="0"/>
+              </p:cNvCxnSpPr>
+              <p:nvPr/>
+            </p:nvCxnSpPr>
+            <p:spPr>
+              <a:xfrm>
+                <a:off x="4581701" y="3139785"/>
+                <a:ext cx="463979" cy="0"/>
+              </a:xfrm>
+              <a:prstGeom prst="line">
+                <a:avLst/>
+              </a:prstGeom>
+              <a:ln cap="rnd"/>
+              <a:effectLst/>
+            </p:spPr>
+            <p:style>
+              <a:lnRef idx="2">
+                <a:schemeClr val="accent1"/>
+              </a:lnRef>
+              <a:fillRef idx="0">
+                <a:schemeClr val="accent1"/>
+              </a:fillRef>
+              <a:effectRef idx="1">
+                <a:schemeClr val="accent1"/>
+              </a:effectRef>
+              <a:fontRef idx="minor">
+                <a:schemeClr val="tx1"/>
+              </a:fontRef>
+            </p:style>
+          </p:cxnSp>
+          <p:cxnSp>
+            <p:nvCxnSpPr>
+              <p:cNvPr id="67" name="Straight Connector 66"/>
+              <p:cNvCxnSpPr>
+                <a:stCxn id="27" idx="0"/>
+                <a:endCxn id="28" idx="0"/>
+              </p:cNvCxnSpPr>
+              <p:nvPr/>
+            </p:nvCxnSpPr>
+            <p:spPr>
+              <a:xfrm>
+                <a:off x="4581701" y="3378098"/>
+                <a:ext cx="350857" cy="0"/>
+              </a:xfrm>
+              <a:prstGeom prst="line">
+                <a:avLst/>
+              </a:prstGeom>
+              <a:ln cap="rnd"/>
+              <a:effectLst/>
+            </p:spPr>
+            <p:style>
+              <a:lnRef idx="2">
+                <a:schemeClr val="accent1"/>
+              </a:lnRef>
+              <a:fillRef idx="0">
+                <a:schemeClr val="accent1"/>
+              </a:fillRef>
+              <a:effectRef idx="1">
+                <a:schemeClr val="accent1"/>
+              </a:effectRef>
+              <a:fontRef idx="minor">
+                <a:schemeClr val="tx1"/>
+              </a:fontRef>
+            </p:style>
+          </p:cxnSp>
+          <p:cxnSp>
+            <p:nvCxnSpPr>
+              <p:cNvPr id="71" name="Straight Connector 70"/>
+              <p:cNvCxnSpPr>
+                <a:stCxn id="27" idx="2"/>
+                <a:endCxn id="30" idx="0"/>
+              </p:cNvCxnSpPr>
+              <p:nvPr/>
+            </p:nvCxnSpPr>
+            <p:spPr>
+              <a:xfrm>
+                <a:off x="4581701" y="3606937"/>
+                <a:ext cx="350857" cy="338"/>
+              </a:xfrm>
+              <a:prstGeom prst="line">
+                <a:avLst/>
+              </a:prstGeom>
+              <a:ln cap="rnd"/>
+              <a:effectLst/>
+            </p:spPr>
+            <p:style>
+              <a:lnRef idx="2">
+                <a:schemeClr val="accent1"/>
+              </a:lnRef>
+              <a:fillRef idx="0">
+                <a:schemeClr val="accent1"/>
+              </a:fillRef>
+              <a:effectRef idx="1">
+                <a:schemeClr val="accent1"/>
+              </a:effectRef>
+              <a:fontRef idx="minor">
+                <a:schemeClr val="tx1"/>
+              </a:fontRef>
+            </p:style>
+          </p:cxnSp>
+          <p:cxnSp>
+            <p:nvCxnSpPr>
+              <p:cNvPr id="74" name="Straight Connector 73"/>
+              <p:cNvCxnSpPr>
+                <a:stCxn id="31" idx="0"/>
+                <a:endCxn id="32" idx="0"/>
+              </p:cNvCxnSpPr>
+              <p:nvPr/>
+            </p:nvCxnSpPr>
+            <p:spPr>
+              <a:xfrm>
+                <a:off x="4581701" y="3836114"/>
+                <a:ext cx="463979" cy="0"/>
+              </a:xfrm>
+              <a:prstGeom prst="line">
+                <a:avLst/>
+              </a:prstGeom>
+              <a:ln cap="rnd"/>
+              <a:effectLst/>
+            </p:spPr>
+            <p:style>
+              <a:lnRef idx="2">
+                <a:schemeClr val="accent1"/>
+              </a:lnRef>
+              <a:fillRef idx="0">
+                <a:schemeClr val="accent1"/>
+              </a:fillRef>
+              <a:effectRef idx="1">
+                <a:schemeClr val="accent1"/>
+              </a:effectRef>
+              <a:fontRef idx="minor">
+                <a:schemeClr val="tx1"/>
+              </a:fontRef>
+            </p:style>
+          </p:cxnSp>
+          <p:cxnSp>
+            <p:nvCxnSpPr>
+              <p:cNvPr id="77" name="Straight Connector 76"/>
+              <p:cNvCxnSpPr>
+                <a:stCxn id="31" idx="2"/>
+                <a:endCxn id="34" idx="0"/>
+              </p:cNvCxnSpPr>
+              <p:nvPr/>
+            </p:nvCxnSpPr>
+            <p:spPr>
+              <a:xfrm flipV="1">
+                <a:off x="4581701" y="4062693"/>
+                <a:ext cx="350857" cy="2260"/>
+              </a:xfrm>
+              <a:prstGeom prst="line">
+                <a:avLst/>
+              </a:prstGeom>
+              <a:ln cap="rnd"/>
+              <a:effectLst/>
+            </p:spPr>
+            <p:style>
+              <a:lnRef idx="2">
+                <a:schemeClr val="accent1"/>
+              </a:lnRef>
+              <a:fillRef idx="0">
+                <a:schemeClr val="accent1"/>
+              </a:fillRef>
+              <a:effectRef idx="1">
+                <a:schemeClr val="accent1"/>
+              </a:effectRef>
+              <a:fontRef idx="minor">
+                <a:schemeClr val="tx1"/>
+              </a:fontRef>
+            </p:style>
+          </p:cxnSp>
+          <p:cxnSp>
+            <p:nvCxnSpPr>
+              <p:cNvPr id="81" name="Straight Connector 80"/>
+              <p:cNvCxnSpPr>
+                <a:stCxn id="33" idx="2"/>
+                <a:endCxn id="34" idx="2"/>
+              </p:cNvCxnSpPr>
+              <p:nvPr/>
+            </p:nvCxnSpPr>
+            <p:spPr>
+              <a:xfrm>
+                <a:off x="4581701" y="4291532"/>
+                <a:ext cx="350857" cy="0"/>
+              </a:xfrm>
+              <a:prstGeom prst="line">
+                <a:avLst/>
+              </a:prstGeom>
+              <a:ln cap="rnd"/>
+              <a:effectLst/>
+            </p:spPr>
+            <p:style>
+              <a:lnRef idx="2">
+                <a:schemeClr val="accent1"/>
+              </a:lnRef>
+              <a:fillRef idx="0">
+                <a:schemeClr val="accent1"/>
+              </a:fillRef>
+              <a:effectRef idx="1">
+                <a:schemeClr val="accent1"/>
+              </a:effectRef>
+              <a:fontRef idx="minor">
+                <a:schemeClr val="tx1"/>
+              </a:fontRef>
+            </p:style>
+          </p:cxnSp>
+        </p:grpSp>
+        <p:sp>
+          <p:nvSpPr>
+            <p:cNvPr id="85" name="TextBox 84"/>
+            <p:cNvSpPr txBox="1"/>
+            <p:nvPr/>
+          </p:nvSpPr>
+          <p:spPr>
+            <a:xfrm>
+              <a:off x="2210511" y="1953167"/>
+              <a:ext cx="1704728" cy="1200329"/>
+            </a:xfrm>
+            <a:prstGeom prst="rect">
+              <a:avLst/>
+            </a:prstGeom>
+            <a:noFill/>
+          </p:spPr>
+          <p:txBody>
+            <a:bodyPr wrap="none" rtlCol="0">
+              <a:spAutoFit/>
+            </a:bodyPr>
+            <a:lstStyle/>
+            <a:p>
+              <a:pPr algn="ctr"/>
+              <a:r>
+                <a:rPr lang="en-US" sz="7200" b="1" i="1" dirty="0">
+                  <a:latin typeface="Apple Chancery"/>
+                  <a:cs typeface="Apple Chancery"/>
+                </a:rPr>
+                <a:t>M</a:t>
+              </a:r>
+            </a:p>
+          </p:txBody>
+        </p:sp>
+      </p:grpSp>
+    </p:spTree>
+    <p:extLst>
+      <p:ext uri="{BB962C8B-B14F-4D97-AF65-F5344CB8AC3E}">
+        <p14:creationId xmlns:p14="http://schemas.microsoft.com/office/powerpoint/2010/main" val="251638271"/>
       </p:ext>
     </p:extLst>
   </p:cSld>

</xml_diff>

<commit_message>
Update icons and slopeview.
</commit_message>
<xml_diff>
--- a/viewer/icons/icons.pptx
+++ b/viewer/icons/icons.pptx
@@ -289,7 +289,7 @@
           <a:p>
             <a:fld id="{3D753955-9DDD-DB49-A632-67C4F7FA4A10}" type="datetimeFigureOut">
               <a:rPr lang="en-US" smtClean="0"/>
-              <a:t>11/4/12</a:t>
+              <a:t>11/5/12</a:t>
             </a:fld>
             <a:endParaRPr lang="en-US"/>
           </a:p>
@@ -459,7 +459,7 @@
           <a:p>
             <a:fld id="{3D753955-9DDD-DB49-A632-67C4F7FA4A10}" type="datetimeFigureOut">
               <a:rPr lang="en-US" smtClean="0"/>
-              <a:t>11/4/12</a:t>
+              <a:t>11/5/12</a:t>
             </a:fld>
             <a:endParaRPr lang="en-US"/>
           </a:p>
@@ -639,7 +639,7 @@
           <a:p>
             <a:fld id="{3D753955-9DDD-DB49-A632-67C4F7FA4A10}" type="datetimeFigureOut">
               <a:rPr lang="en-US" smtClean="0"/>
-              <a:t>11/4/12</a:t>
+              <a:t>11/5/12</a:t>
             </a:fld>
             <a:endParaRPr lang="en-US"/>
           </a:p>
@@ -809,7 +809,7 @@
           <a:p>
             <a:fld id="{3D753955-9DDD-DB49-A632-67C4F7FA4A10}" type="datetimeFigureOut">
               <a:rPr lang="en-US" smtClean="0"/>
-              <a:t>11/4/12</a:t>
+              <a:t>11/5/12</a:t>
             </a:fld>
             <a:endParaRPr lang="en-US"/>
           </a:p>
@@ -1055,7 +1055,7 @@
           <a:p>
             <a:fld id="{3D753955-9DDD-DB49-A632-67C4F7FA4A10}" type="datetimeFigureOut">
               <a:rPr lang="en-US" smtClean="0"/>
-              <a:t>11/4/12</a:t>
+              <a:t>11/5/12</a:t>
             </a:fld>
             <a:endParaRPr lang="en-US"/>
           </a:p>
@@ -1343,7 +1343,7 @@
           <a:p>
             <a:fld id="{3D753955-9DDD-DB49-A632-67C4F7FA4A10}" type="datetimeFigureOut">
               <a:rPr lang="en-US" smtClean="0"/>
-              <a:t>11/4/12</a:t>
+              <a:t>11/5/12</a:t>
             </a:fld>
             <a:endParaRPr lang="en-US"/>
           </a:p>
@@ -1765,7 +1765,7 @@
           <a:p>
             <a:fld id="{3D753955-9DDD-DB49-A632-67C4F7FA4A10}" type="datetimeFigureOut">
               <a:rPr lang="en-US" smtClean="0"/>
-              <a:t>11/4/12</a:t>
+              <a:t>11/5/12</a:t>
             </a:fld>
             <a:endParaRPr lang="en-US"/>
           </a:p>
@@ -1883,7 +1883,7 @@
           <a:p>
             <a:fld id="{3D753955-9DDD-DB49-A632-67C4F7FA4A10}" type="datetimeFigureOut">
               <a:rPr lang="en-US" smtClean="0"/>
-              <a:t>11/4/12</a:t>
+              <a:t>11/5/12</a:t>
             </a:fld>
             <a:endParaRPr lang="en-US"/>
           </a:p>
@@ -1978,7 +1978,7 @@
           <a:p>
             <a:fld id="{3D753955-9DDD-DB49-A632-67C4F7FA4A10}" type="datetimeFigureOut">
               <a:rPr lang="en-US" smtClean="0"/>
-              <a:t>11/4/12</a:t>
+              <a:t>11/5/12</a:t>
             </a:fld>
             <a:endParaRPr lang="en-US"/>
           </a:p>
@@ -2255,7 +2255,7 @@
           <a:p>
             <a:fld id="{3D753955-9DDD-DB49-A632-67C4F7FA4A10}" type="datetimeFigureOut">
               <a:rPr lang="en-US" smtClean="0"/>
-              <a:t>11/4/12</a:t>
+              <a:t>11/5/12</a:t>
             </a:fld>
             <a:endParaRPr lang="en-US"/>
           </a:p>
@@ -2508,7 +2508,7 @@
           <a:p>
             <a:fld id="{3D753955-9DDD-DB49-A632-67C4F7FA4A10}" type="datetimeFigureOut">
               <a:rPr lang="en-US" smtClean="0"/>
-              <a:t>11/4/12</a:t>
+              <a:t>11/5/12</a:t>
             </a:fld>
             <a:endParaRPr lang="en-US"/>
           </a:p>
@@ -2721,7 +2721,7 @@
           <a:p>
             <a:fld id="{3D753955-9DDD-DB49-A632-67C4F7FA4A10}" type="datetimeFigureOut">
               <a:rPr lang="en-US" smtClean="0"/>
-              <a:t>11/4/12</a:t>
+              <a:t>11/5/12</a:t>
             </a:fld>
             <a:endParaRPr lang="en-US"/>
           </a:p>
@@ -3358,7 +3358,7 @@
             <a:graphicData uri="http://schemas.openxmlformats.org/presentationml/2006/ole">
               <mc:AlternateContent xmlns:mc="http://schemas.openxmlformats.org/markup-compatibility/2006">
                 <mc:Choice xmlns:v="urn:schemas-microsoft-com:vml" Requires="v">
-                  <p:oleObj spid="_x0000_s1031" name="Equation" r:id="rId3" imgW="215900" imgH="393700" progId="Equation.3">
+                  <p:oleObj spid="_x0000_s1034" name="Equation" r:id="rId3" imgW="215900" imgH="393700" progId="Equation.3">
                     <p:embed/>
                   </p:oleObj>
                 </mc:Choice>
@@ -3426,7 +3426,7 @@
       </p:grpSpPr>
       <p:grpSp>
         <p:nvGrpSpPr>
-          <p:cNvPr id="86" name="Group 85"/>
+          <p:cNvPr id="2" name="Group 1"/>
           <p:cNvGrpSpPr/>
           <p:nvPr/>
         </p:nvGrpSpPr>
@@ -4692,7 +4692,11 @@
               <a:prstGeom prst="line">
                 <a:avLst/>
               </a:prstGeom>
-              <a:ln cap="rnd"/>
+              <a:ln cap="rnd">
+                <a:solidFill>
+                  <a:srgbClr val="008000"/>
+                </a:solidFill>
+              </a:ln>
               <a:effectLst/>
             </p:spPr>
             <p:style>
@@ -4727,7 +4731,11 @@
               <a:prstGeom prst="line">
                 <a:avLst/>
               </a:prstGeom>
-              <a:ln cap="rnd"/>
+              <a:ln cap="rnd">
+                <a:solidFill>
+                  <a:srgbClr val="008000"/>
+                </a:solidFill>
+              </a:ln>
               <a:effectLst/>
             </p:spPr>
             <p:style>
@@ -4762,7 +4770,11 @@
               <a:prstGeom prst="line">
                 <a:avLst/>
               </a:prstGeom>
-              <a:ln cap="rnd"/>
+              <a:ln cap="rnd">
+                <a:solidFill>
+                  <a:srgbClr val="008000"/>
+                </a:solidFill>
+              </a:ln>
               <a:effectLst/>
             </p:spPr>
             <p:style>
@@ -4797,7 +4809,11 @@
               <a:prstGeom prst="line">
                 <a:avLst/>
               </a:prstGeom>
-              <a:ln cap="rnd"/>
+              <a:ln cap="rnd">
+                <a:solidFill>
+                  <a:srgbClr val="008000"/>
+                </a:solidFill>
+              </a:ln>
               <a:effectLst/>
             </p:spPr>
             <p:style>
@@ -4832,7 +4848,11 @@
               <a:prstGeom prst="line">
                 <a:avLst/>
               </a:prstGeom>
-              <a:ln cap="rnd"/>
+              <a:ln cap="rnd">
+                <a:solidFill>
+                  <a:srgbClr val="008000"/>
+                </a:solidFill>
+              </a:ln>
               <a:effectLst/>
             </p:spPr>
             <p:style>
@@ -4867,7 +4887,11 @@
               <a:prstGeom prst="line">
                 <a:avLst/>
               </a:prstGeom>
-              <a:ln cap="rnd"/>
+              <a:ln cap="rnd">
+                <a:solidFill>
+                  <a:srgbClr val="008000"/>
+                </a:solidFill>
+              </a:ln>
               <a:effectLst/>
             </p:spPr>
             <p:style>
@@ -4902,7 +4926,11 @@
               <a:prstGeom prst="line">
                 <a:avLst/>
               </a:prstGeom>
-              <a:ln cap="rnd"/>
+              <a:ln cap="rnd">
+                <a:solidFill>
+                  <a:srgbClr val="008000"/>
+                </a:solidFill>
+              </a:ln>
               <a:effectLst/>
             </p:spPr>
             <p:style>
@@ -4937,7 +4965,11 @@
               <a:prstGeom prst="line">
                 <a:avLst/>
               </a:prstGeom>
-              <a:ln cap="rnd"/>
+              <a:ln cap="rnd">
+                <a:solidFill>
+                  <a:srgbClr val="008000"/>
+                </a:solidFill>
+              </a:ln>
               <a:effectLst/>
             </p:spPr>
             <p:style>
@@ -4972,7 +5004,11 @@
               <a:prstGeom prst="line">
                 <a:avLst/>
               </a:prstGeom>
-              <a:ln cap="rnd"/>
+              <a:ln cap="rnd">
+                <a:solidFill>
+                  <a:srgbClr val="008000"/>
+                </a:solidFill>
+              </a:ln>
               <a:effectLst/>
             </p:spPr>
             <p:style>
@@ -5007,7 +5043,11 @@
               <a:prstGeom prst="line">
                 <a:avLst/>
               </a:prstGeom>
-              <a:ln cap="rnd"/>
+              <a:ln cap="rnd">
+                <a:solidFill>
+                  <a:srgbClr val="008000"/>
+                </a:solidFill>
+              </a:ln>
               <a:effectLst/>
             </p:spPr>
             <p:style>
@@ -5042,7 +5082,11 @@
               <a:prstGeom prst="line">
                 <a:avLst/>
               </a:prstGeom>
-              <a:ln cap="rnd"/>
+              <a:ln cap="rnd">
+                <a:solidFill>
+                  <a:srgbClr val="008000"/>
+                </a:solidFill>
+              </a:ln>
               <a:effectLst/>
             </p:spPr>
             <p:style>
@@ -5077,7 +5121,11 @@
               <a:prstGeom prst="line">
                 <a:avLst/>
               </a:prstGeom>
-              <a:ln cap="rnd"/>
+              <a:ln cap="rnd">
+                <a:solidFill>
+                  <a:srgbClr val="008000"/>
+                </a:solidFill>
+              </a:ln>
               <a:effectLst/>
             </p:spPr>
             <p:style>
@@ -5112,7 +5160,11 @@
               <a:prstGeom prst="line">
                 <a:avLst/>
               </a:prstGeom>
-              <a:ln cap="rnd"/>
+              <a:ln cap="rnd">
+                <a:solidFill>
+                  <a:srgbClr val="008000"/>
+                </a:solidFill>
+              </a:ln>
               <a:effectLst/>
             </p:spPr>
             <p:style>
@@ -5147,7 +5199,11 @@
               <a:prstGeom prst="line">
                 <a:avLst/>
               </a:prstGeom>
-              <a:ln cap="rnd"/>
+              <a:ln cap="rnd">
+                <a:solidFill>
+                  <a:srgbClr val="008000"/>
+                </a:solidFill>
+              </a:ln>
               <a:effectLst/>
             </p:spPr>
             <p:style>

</xml_diff>

<commit_message>
Added rudimentary graph display.
</commit_message>
<xml_diff>
--- a/viewer/icons/icons.pptx
+++ b/viewer/icons/icons.pptx
@@ -7,6 +7,7 @@
   <p:sldIdLst>
     <p:sldId id="257" r:id="rId2"/>
     <p:sldId id="258" r:id="rId3"/>
+    <p:sldId id="259" r:id="rId4"/>
   </p:sldIdLst>
   <p:sldSz cx="9144000" cy="6858000" type="screen4x3"/>
   <p:notesSz cx="6858000" cy="9144000"/>
@@ -3358,7 +3359,7 @@
             <a:graphicData uri="http://schemas.openxmlformats.org/presentationml/2006/ole">
               <mc:AlternateContent xmlns:mc="http://schemas.openxmlformats.org/markup-compatibility/2006">
                 <mc:Choice xmlns:v="urn:schemas-microsoft-com:vml" Requires="v">
-                  <p:oleObj spid="_x0000_s1034" name="Equation" r:id="rId3" imgW="215900" imgH="393700" progId="Equation.3">
+                  <p:oleObj spid="_x0000_s1036" name="Equation" r:id="rId3" imgW="215900" imgH="393700" progId="Equation.3">
                     <p:embed/>
                   </p:oleObj>
                 </mc:Choice>
@@ -5260,6 +5261,576 @@
     <p:extLst>
       <p:ext uri="{BB962C8B-B14F-4D97-AF65-F5344CB8AC3E}">
         <p14:creationId xmlns:p14="http://schemas.microsoft.com/office/powerpoint/2010/main" val="251638271"/>
+      </p:ext>
+    </p:extLst>
+  </p:cSld>
+  <p:clrMapOvr>
+    <a:masterClrMapping/>
+  </p:clrMapOvr>
+</p:sld>
+</file>
+
+<file path=ppt/slides/slide3.xml><?xml version="1.0" encoding="utf-8"?>
+<p:sld xmlns:a="http://schemas.openxmlformats.org/drawingml/2006/main" xmlns:r="http://schemas.openxmlformats.org/officeDocument/2006/relationships" xmlns:p="http://schemas.openxmlformats.org/presentationml/2006/main">
+  <p:cSld>
+    <p:spTree>
+      <p:nvGrpSpPr>
+        <p:cNvPr id="1" name=""/>
+        <p:cNvGrpSpPr/>
+        <p:nvPr/>
+      </p:nvGrpSpPr>
+      <p:grpSpPr>
+        <a:xfrm>
+          <a:off x="0" y="0"/>
+          <a:ext cx="0" cy="0"/>
+          <a:chOff x="0" y="0"/>
+          <a:chExt cx="0" cy="0"/>
+        </a:xfrm>
+      </p:grpSpPr>
+      <p:grpSp>
+        <p:nvGrpSpPr>
+          <p:cNvPr id="47" name="Group 46"/>
+          <p:cNvGrpSpPr/>
+          <p:nvPr/>
+        </p:nvGrpSpPr>
+        <p:grpSpPr>
+          <a:xfrm>
+            <a:off x="1326106" y="1384472"/>
+            <a:ext cx="2338888" cy="2336640"/>
+            <a:chOff x="1326106" y="1384472"/>
+            <a:chExt cx="2338888" cy="2336640"/>
+          </a:xfrm>
+        </p:grpSpPr>
+        <p:grpSp>
+          <p:nvGrpSpPr>
+            <p:cNvPr id="5" name="Group 4"/>
+            <p:cNvGrpSpPr/>
+            <p:nvPr/>
+          </p:nvGrpSpPr>
+          <p:grpSpPr>
+            <a:xfrm>
+              <a:off x="1326106" y="1384472"/>
+              <a:ext cx="2338888" cy="2336640"/>
+              <a:chOff x="1613142" y="1384472"/>
+              <a:chExt cx="2338888" cy="2336640"/>
+            </a:xfrm>
+          </p:grpSpPr>
+          <p:sp>
+            <p:nvSpPr>
+              <p:cNvPr id="11" name="Rounded Rectangle 10"/>
+              <p:cNvSpPr>
+                <a:spLocks noChangeAspect="1"/>
+              </p:cNvSpPr>
+              <p:nvPr/>
+            </p:nvSpPr>
+            <p:spPr>
+              <a:xfrm>
+                <a:off x="1613142" y="1384472"/>
+                <a:ext cx="2338888" cy="2336640"/>
+              </a:xfrm>
+              <a:prstGeom prst="roundRect">
+                <a:avLst/>
+              </a:prstGeom>
+              <a:solidFill>
+                <a:schemeClr val="accent1"/>
+              </a:solidFill>
+              <a:effectLst/>
+            </p:spPr>
+            <p:style>
+              <a:lnRef idx="1">
+                <a:schemeClr val="accent1"/>
+              </a:lnRef>
+              <a:fillRef idx="3">
+                <a:schemeClr val="accent1"/>
+              </a:fillRef>
+              <a:effectRef idx="2">
+                <a:schemeClr val="accent1"/>
+              </a:effectRef>
+              <a:fontRef idx="minor">
+                <a:schemeClr val="lt1"/>
+              </a:fontRef>
+            </p:style>
+            <p:txBody>
+              <a:bodyPr rtlCol="0" anchor="ctr"/>
+              <a:lstStyle/>
+              <a:p>
+                <a:pPr algn="ctr"/>
+                <a:endParaRPr lang="en-US"/>
+              </a:p>
+            </p:txBody>
+          </p:sp>
+          <p:sp>
+            <p:nvSpPr>
+              <p:cNvPr id="12" name="Rounded Rectangle 11"/>
+              <p:cNvSpPr>
+                <a:spLocks noChangeAspect="1"/>
+              </p:cNvSpPr>
+              <p:nvPr/>
+            </p:nvSpPr>
+            <p:spPr>
+              <a:xfrm>
+                <a:off x="1759590" y="1530776"/>
+                <a:ext cx="2045992" cy="2044032"/>
+              </a:xfrm>
+              <a:prstGeom prst="roundRect">
+                <a:avLst/>
+              </a:prstGeom>
+              <a:solidFill>
+                <a:schemeClr val="bg1"/>
+              </a:solidFill>
+              <a:effectLst/>
+            </p:spPr>
+            <p:style>
+              <a:lnRef idx="1">
+                <a:schemeClr val="accent1"/>
+              </a:lnRef>
+              <a:fillRef idx="3">
+                <a:schemeClr val="accent1"/>
+              </a:fillRef>
+              <a:effectRef idx="2">
+                <a:schemeClr val="accent1"/>
+              </a:effectRef>
+              <a:fontRef idx="minor">
+                <a:schemeClr val="lt1"/>
+              </a:fontRef>
+            </p:style>
+            <p:txBody>
+              <a:bodyPr rtlCol="0" anchor="ctr"/>
+              <a:lstStyle/>
+              <a:p>
+                <a:pPr algn="ctr"/>
+                <a:endParaRPr lang="en-US"/>
+              </a:p>
+            </p:txBody>
+          </p:sp>
+        </p:grpSp>
+        <p:grpSp>
+          <p:nvGrpSpPr>
+            <p:cNvPr id="45" name="Group 44"/>
+            <p:cNvGrpSpPr/>
+            <p:nvPr/>
+          </p:nvGrpSpPr>
+          <p:grpSpPr>
+            <a:xfrm>
+              <a:off x="1628775" y="1828892"/>
+              <a:ext cx="1733550" cy="1447800"/>
+              <a:chOff x="1689100" y="1803400"/>
+              <a:chExt cx="1733550" cy="1447800"/>
+            </a:xfrm>
+          </p:grpSpPr>
+          <p:sp>
+            <p:nvSpPr>
+              <p:cNvPr id="3" name="Oval 2"/>
+              <p:cNvSpPr/>
+              <p:nvPr/>
+            </p:nvSpPr>
+            <p:spPr>
+              <a:xfrm>
+                <a:off x="2144183" y="1803400"/>
+                <a:ext cx="368300" cy="203200"/>
+              </a:xfrm>
+              <a:prstGeom prst="ellipse">
+                <a:avLst/>
+              </a:prstGeom>
+              <a:solidFill>
+                <a:srgbClr val="FFFF66"/>
+              </a:solidFill>
+              <a:ln w="19050" cmpd="sng">
+                <a:solidFill>
+                  <a:srgbClr val="000000"/>
+                </a:solidFill>
+              </a:ln>
+              <a:effectLst/>
+            </p:spPr>
+            <p:style>
+              <a:lnRef idx="1">
+                <a:schemeClr val="accent1"/>
+              </a:lnRef>
+              <a:fillRef idx="3">
+                <a:schemeClr val="accent1"/>
+              </a:fillRef>
+              <a:effectRef idx="2">
+                <a:schemeClr val="accent1"/>
+              </a:effectRef>
+              <a:fontRef idx="minor">
+                <a:schemeClr val="lt1"/>
+              </a:fontRef>
+            </p:style>
+            <p:txBody>
+              <a:bodyPr rtlCol="0" anchor="ctr"/>
+              <a:lstStyle/>
+              <a:p>
+                <a:pPr algn="ctr"/>
+                <a:endParaRPr lang="en-US"/>
+              </a:p>
+            </p:txBody>
+          </p:sp>
+          <p:sp>
+            <p:nvSpPr>
+              <p:cNvPr id="50" name="Oval 49"/>
+              <p:cNvSpPr/>
+              <p:nvPr/>
+            </p:nvSpPr>
+            <p:spPr>
+              <a:xfrm>
+                <a:off x="1689100" y="2425700"/>
+                <a:ext cx="368300" cy="203200"/>
+              </a:xfrm>
+              <a:prstGeom prst="ellipse">
+                <a:avLst/>
+              </a:prstGeom>
+              <a:solidFill>
+                <a:schemeClr val="tx2">
+                  <a:lumMod val="60000"/>
+                  <a:lumOff val="40000"/>
+                </a:schemeClr>
+              </a:solidFill>
+              <a:ln w="19050" cmpd="sng">
+                <a:solidFill>
+                  <a:srgbClr val="000000"/>
+                </a:solidFill>
+              </a:ln>
+              <a:effectLst/>
+            </p:spPr>
+            <p:style>
+              <a:lnRef idx="1">
+                <a:schemeClr val="accent1"/>
+              </a:lnRef>
+              <a:fillRef idx="3">
+                <a:schemeClr val="accent1"/>
+              </a:fillRef>
+              <a:effectRef idx="2">
+                <a:schemeClr val="accent1"/>
+              </a:effectRef>
+              <a:fontRef idx="minor">
+                <a:schemeClr val="lt1"/>
+              </a:fontRef>
+            </p:style>
+            <p:txBody>
+              <a:bodyPr rtlCol="0" anchor="ctr"/>
+              <a:lstStyle/>
+              <a:p>
+                <a:pPr algn="ctr"/>
+                <a:endParaRPr lang="en-US"/>
+              </a:p>
+            </p:txBody>
+          </p:sp>
+          <p:sp>
+            <p:nvSpPr>
+              <p:cNvPr id="51" name="Oval 50"/>
+              <p:cNvSpPr/>
+              <p:nvPr/>
+            </p:nvSpPr>
+            <p:spPr>
+              <a:xfrm>
+                <a:off x="2599266" y="2425700"/>
+                <a:ext cx="368300" cy="203200"/>
+              </a:xfrm>
+              <a:prstGeom prst="ellipse">
+                <a:avLst/>
+              </a:prstGeom>
+              <a:solidFill>
+                <a:schemeClr val="tx2">
+                  <a:lumMod val="60000"/>
+                  <a:lumOff val="40000"/>
+                </a:schemeClr>
+              </a:solidFill>
+              <a:ln w="19050" cmpd="sng">
+                <a:solidFill>
+                  <a:srgbClr val="000000"/>
+                </a:solidFill>
+              </a:ln>
+              <a:effectLst/>
+            </p:spPr>
+            <p:style>
+              <a:lnRef idx="1">
+                <a:schemeClr val="accent1"/>
+              </a:lnRef>
+              <a:fillRef idx="3">
+                <a:schemeClr val="accent1"/>
+              </a:fillRef>
+              <a:effectRef idx="2">
+                <a:schemeClr val="accent1"/>
+              </a:effectRef>
+              <a:fontRef idx="minor">
+                <a:schemeClr val="lt1"/>
+              </a:fontRef>
+            </p:style>
+            <p:txBody>
+              <a:bodyPr rtlCol="0" anchor="ctr"/>
+              <a:lstStyle/>
+              <a:p>
+                <a:pPr algn="ctr"/>
+                <a:endParaRPr lang="en-US"/>
+              </a:p>
+            </p:txBody>
+          </p:sp>
+          <p:sp>
+            <p:nvSpPr>
+              <p:cNvPr id="53" name="Oval 52"/>
+              <p:cNvSpPr/>
+              <p:nvPr/>
+            </p:nvSpPr>
+            <p:spPr>
+              <a:xfrm>
+                <a:off x="2144183" y="3048000"/>
+                <a:ext cx="368300" cy="203200"/>
+              </a:xfrm>
+              <a:prstGeom prst="ellipse">
+                <a:avLst/>
+              </a:prstGeom>
+              <a:solidFill>
+                <a:schemeClr val="accent5">
+                  <a:lumMod val="60000"/>
+                  <a:lumOff val="40000"/>
+                </a:schemeClr>
+              </a:solidFill>
+              <a:ln w="19050" cmpd="sng">
+                <a:solidFill>
+                  <a:srgbClr val="000000"/>
+                </a:solidFill>
+              </a:ln>
+              <a:effectLst/>
+            </p:spPr>
+            <p:style>
+              <a:lnRef idx="1">
+                <a:schemeClr val="accent1"/>
+              </a:lnRef>
+              <a:fillRef idx="3">
+                <a:schemeClr val="accent1"/>
+              </a:fillRef>
+              <a:effectRef idx="2">
+                <a:schemeClr val="accent1"/>
+              </a:effectRef>
+              <a:fontRef idx="minor">
+                <a:schemeClr val="lt1"/>
+              </a:fontRef>
+            </p:style>
+            <p:txBody>
+              <a:bodyPr rtlCol="0" anchor="ctr"/>
+              <a:lstStyle/>
+              <a:p>
+                <a:pPr algn="ctr"/>
+                <a:endParaRPr lang="en-US"/>
+              </a:p>
+            </p:txBody>
+          </p:sp>
+          <p:sp>
+            <p:nvSpPr>
+              <p:cNvPr id="54" name="Oval 53"/>
+              <p:cNvSpPr/>
+              <p:nvPr/>
+            </p:nvSpPr>
+            <p:spPr>
+              <a:xfrm>
+                <a:off x="3054350" y="3048000"/>
+                <a:ext cx="368300" cy="203200"/>
+              </a:xfrm>
+              <a:prstGeom prst="ellipse">
+                <a:avLst/>
+              </a:prstGeom>
+              <a:solidFill>
+                <a:schemeClr val="accent5">
+                  <a:lumMod val="60000"/>
+                  <a:lumOff val="40000"/>
+                </a:schemeClr>
+              </a:solidFill>
+              <a:ln w="19050" cmpd="sng">
+                <a:solidFill>
+                  <a:srgbClr val="000000"/>
+                </a:solidFill>
+              </a:ln>
+              <a:effectLst/>
+            </p:spPr>
+            <p:style>
+              <a:lnRef idx="1">
+                <a:schemeClr val="accent1"/>
+              </a:lnRef>
+              <a:fillRef idx="3">
+                <a:schemeClr val="accent1"/>
+              </a:fillRef>
+              <a:effectRef idx="2">
+                <a:schemeClr val="accent1"/>
+              </a:effectRef>
+              <a:fontRef idx="minor">
+                <a:schemeClr val="lt1"/>
+              </a:fontRef>
+            </p:style>
+            <p:txBody>
+              <a:bodyPr rtlCol="0" anchor="ctr"/>
+              <a:lstStyle/>
+              <a:p>
+                <a:pPr algn="ctr"/>
+                <a:endParaRPr lang="en-US"/>
+              </a:p>
+            </p:txBody>
+          </p:sp>
+          <p:cxnSp>
+            <p:nvCxnSpPr>
+              <p:cNvPr id="8" name="Straight Arrow Connector 7"/>
+              <p:cNvCxnSpPr>
+                <a:stCxn id="50" idx="0"/>
+                <a:endCxn id="3" idx="4"/>
+              </p:cNvCxnSpPr>
+              <p:nvPr/>
+            </p:nvCxnSpPr>
+            <p:spPr>
+              <a:xfrm flipV="1">
+                <a:off x="1873250" y="2006600"/>
+                <a:ext cx="455083" cy="419100"/>
+              </a:xfrm>
+              <a:prstGeom prst="straightConnector1">
+                <a:avLst/>
+              </a:prstGeom>
+              <a:ln>
+                <a:solidFill>
+                  <a:srgbClr val="000000"/>
+                </a:solidFill>
+                <a:tailEnd type="arrow"/>
+              </a:ln>
+              <a:effectLst/>
+            </p:spPr>
+            <p:style>
+              <a:lnRef idx="2">
+                <a:schemeClr val="accent1"/>
+              </a:lnRef>
+              <a:fillRef idx="0">
+                <a:schemeClr val="accent1"/>
+              </a:fillRef>
+              <a:effectRef idx="1">
+                <a:schemeClr val="accent1"/>
+              </a:effectRef>
+              <a:fontRef idx="minor">
+                <a:schemeClr val="tx1"/>
+              </a:fontRef>
+            </p:style>
+          </p:cxnSp>
+          <p:cxnSp>
+            <p:nvCxnSpPr>
+              <p:cNvPr id="57" name="Straight Arrow Connector 56"/>
+              <p:cNvCxnSpPr>
+                <a:stCxn id="51" idx="0"/>
+                <a:endCxn id="3" idx="4"/>
+              </p:cNvCxnSpPr>
+              <p:nvPr/>
+            </p:nvCxnSpPr>
+            <p:spPr>
+              <a:xfrm flipH="1" flipV="1">
+                <a:off x="2328333" y="2006600"/>
+                <a:ext cx="455083" cy="419100"/>
+              </a:xfrm>
+              <a:prstGeom prst="straightConnector1">
+                <a:avLst/>
+              </a:prstGeom>
+              <a:ln>
+                <a:solidFill>
+                  <a:srgbClr val="000000"/>
+                </a:solidFill>
+                <a:tailEnd type="arrow"/>
+              </a:ln>
+              <a:effectLst/>
+            </p:spPr>
+            <p:style>
+              <a:lnRef idx="2">
+                <a:schemeClr val="accent1"/>
+              </a:lnRef>
+              <a:fillRef idx="0">
+                <a:schemeClr val="accent1"/>
+              </a:fillRef>
+              <a:effectRef idx="1">
+                <a:schemeClr val="accent1"/>
+              </a:effectRef>
+              <a:fontRef idx="minor">
+                <a:schemeClr val="tx1"/>
+              </a:fontRef>
+            </p:style>
+          </p:cxnSp>
+          <p:cxnSp>
+            <p:nvCxnSpPr>
+              <p:cNvPr id="60" name="Straight Arrow Connector 59"/>
+              <p:cNvCxnSpPr>
+                <a:stCxn id="53" idx="0"/>
+                <a:endCxn id="51" idx="4"/>
+              </p:cNvCxnSpPr>
+              <p:nvPr/>
+            </p:nvCxnSpPr>
+            <p:spPr>
+              <a:xfrm flipV="1">
+                <a:off x="2328333" y="2628900"/>
+                <a:ext cx="455083" cy="419100"/>
+              </a:xfrm>
+              <a:prstGeom prst="straightConnector1">
+                <a:avLst/>
+              </a:prstGeom>
+              <a:ln>
+                <a:solidFill>
+                  <a:srgbClr val="000000"/>
+                </a:solidFill>
+                <a:tailEnd type="arrow"/>
+              </a:ln>
+              <a:effectLst/>
+            </p:spPr>
+            <p:style>
+              <a:lnRef idx="2">
+                <a:schemeClr val="accent1"/>
+              </a:lnRef>
+              <a:fillRef idx="0">
+                <a:schemeClr val="accent1"/>
+              </a:fillRef>
+              <a:effectRef idx="1">
+                <a:schemeClr val="accent1"/>
+              </a:effectRef>
+              <a:fontRef idx="minor">
+                <a:schemeClr val="tx1"/>
+              </a:fontRef>
+            </p:style>
+          </p:cxnSp>
+          <p:cxnSp>
+            <p:nvCxnSpPr>
+              <p:cNvPr id="63" name="Straight Arrow Connector 62"/>
+              <p:cNvCxnSpPr>
+                <a:stCxn id="54" idx="0"/>
+                <a:endCxn id="51" idx="4"/>
+              </p:cNvCxnSpPr>
+              <p:nvPr/>
+            </p:nvCxnSpPr>
+            <p:spPr>
+              <a:xfrm flipH="1" flipV="1">
+                <a:off x="2783416" y="2628900"/>
+                <a:ext cx="455084" cy="419100"/>
+              </a:xfrm>
+              <a:prstGeom prst="straightConnector1">
+                <a:avLst/>
+              </a:prstGeom>
+              <a:ln>
+                <a:solidFill>
+                  <a:srgbClr val="000000"/>
+                </a:solidFill>
+                <a:tailEnd type="arrow"/>
+              </a:ln>
+              <a:effectLst/>
+            </p:spPr>
+            <p:style>
+              <a:lnRef idx="2">
+                <a:schemeClr val="accent1"/>
+              </a:lnRef>
+              <a:fillRef idx="0">
+                <a:schemeClr val="accent1"/>
+              </a:fillRef>
+              <a:effectRef idx="1">
+                <a:schemeClr val="accent1"/>
+              </a:effectRef>
+              <a:fontRef idx="minor">
+                <a:schemeClr val="tx1"/>
+              </a:fontRef>
+            </p:style>
+          </p:cxnSp>
+        </p:grpSp>
+      </p:grpSp>
+    </p:spTree>
+    <p:extLst>
+      <p:ext uri="{BB962C8B-B14F-4D97-AF65-F5344CB8AC3E}">
+        <p14:creationId xmlns:p14="http://schemas.microsoft.com/office/powerpoint/2010/main" val="1389197330"/>
       </p:ext>
     </p:extLst>
   </p:cSld>

</xml_diff>

<commit_message>
Added icons for graph view and fixed zooming.
</commit_message>
<xml_diff>
--- a/viewer/icons/icons.pptx
+++ b/viewer/icons/icons.pptx
@@ -8,6 +8,9 @@
     <p:sldId id="257" r:id="rId2"/>
     <p:sldId id="258" r:id="rId3"/>
     <p:sldId id="259" r:id="rId4"/>
+    <p:sldId id="260" r:id="rId5"/>
+    <p:sldId id="261" r:id="rId6"/>
+    <p:sldId id="262" r:id="rId7"/>
   </p:sldIdLst>
   <p:sldSz cx="9144000" cy="6858000" type="screen4x3"/>
   <p:notesSz cx="6858000" cy="9144000"/>
@@ -290,7 +293,7 @@
           <a:p>
             <a:fld id="{3D753955-9DDD-DB49-A632-67C4F7FA4A10}" type="datetimeFigureOut">
               <a:rPr lang="en-US" smtClean="0"/>
-              <a:t>11/5/12</a:t>
+              <a:t>11/6/12</a:t>
             </a:fld>
             <a:endParaRPr lang="en-US"/>
           </a:p>
@@ -460,7 +463,7 @@
           <a:p>
             <a:fld id="{3D753955-9DDD-DB49-A632-67C4F7FA4A10}" type="datetimeFigureOut">
               <a:rPr lang="en-US" smtClean="0"/>
-              <a:t>11/5/12</a:t>
+              <a:t>11/6/12</a:t>
             </a:fld>
             <a:endParaRPr lang="en-US"/>
           </a:p>
@@ -640,7 +643,7 @@
           <a:p>
             <a:fld id="{3D753955-9DDD-DB49-A632-67C4F7FA4A10}" type="datetimeFigureOut">
               <a:rPr lang="en-US" smtClean="0"/>
-              <a:t>11/5/12</a:t>
+              <a:t>11/6/12</a:t>
             </a:fld>
             <a:endParaRPr lang="en-US"/>
           </a:p>
@@ -810,7 +813,7 @@
           <a:p>
             <a:fld id="{3D753955-9DDD-DB49-A632-67C4F7FA4A10}" type="datetimeFigureOut">
               <a:rPr lang="en-US" smtClean="0"/>
-              <a:t>11/5/12</a:t>
+              <a:t>11/6/12</a:t>
             </a:fld>
             <a:endParaRPr lang="en-US"/>
           </a:p>
@@ -1056,7 +1059,7 @@
           <a:p>
             <a:fld id="{3D753955-9DDD-DB49-A632-67C4F7FA4A10}" type="datetimeFigureOut">
               <a:rPr lang="en-US" smtClean="0"/>
-              <a:t>11/5/12</a:t>
+              <a:t>11/6/12</a:t>
             </a:fld>
             <a:endParaRPr lang="en-US"/>
           </a:p>
@@ -1344,7 +1347,7 @@
           <a:p>
             <a:fld id="{3D753955-9DDD-DB49-A632-67C4F7FA4A10}" type="datetimeFigureOut">
               <a:rPr lang="en-US" smtClean="0"/>
-              <a:t>11/5/12</a:t>
+              <a:t>11/6/12</a:t>
             </a:fld>
             <a:endParaRPr lang="en-US"/>
           </a:p>
@@ -1766,7 +1769,7 @@
           <a:p>
             <a:fld id="{3D753955-9DDD-DB49-A632-67C4F7FA4A10}" type="datetimeFigureOut">
               <a:rPr lang="en-US" smtClean="0"/>
-              <a:t>11/5/12</a:t>
+              <a:t>11/6/12</a:t>
             </a:fld>
             <a:endParaRPr lang="en-US"/>
           </a:p>
@@ -1884,7 +1887,7 @@
           <a:p>
             <a:fld id="{3D753955-9DDD-DB49-A632-67C4F7FA4A10}" type="datetimeFigureOut">
               <a:rPr lang="en-US" smtClean="0"/>
-              <a:t>11/5/12</a:t>
+              <a:t>11/6/12</a:t>
             </a:fld>
             <a:endParaRPr lang="en-US"/>
           </a:p>
@@ -1979,7 +1982,7 @@
           <a:p>
             <a:fld id="{3D753955-9DDD-DB49-A632-67C4F7FA4A10}" type="datetimeFigureOut">
               <a:rPr lang="en-US" smtClean="0"/>
-              <a:t>11/5/12</a:t>
+              <a:t>11/6/12</a:t>
             </a:fld>
             <a:endParaRPr lang="en-US"/>
           </a:p>
@@ -2256,7 +2259,7 @@
           <a:p>
             <a:fld id="{3D753955-9DDD-DB49-A632-67C4F7FA4A10}" type="datetimeFigureOut">
               <a:rPr lang="en-US" smtClean="0"/>
-              <a:t>11/5/12</a:t>
+              <a:t>11/6/12</a:t>
             </a:fld>
             <a:endParaRPr lang="en-US"/>
           </a:p>
@@ -2509,7 +2512,7 @@
           <a:p>
             <a:fld id="{3D753955-9DDD-DB49-A632-67C4F7FA4A10}" type="datetimeFigureOut">
               <a:rPr lang="en-US" smtClean="0"/>
-              <a:t>11/5/12</a:t>
+              <a:t>11/6/12</a:t>
             </a:fld>
             <a:endParaRPr lang="en-US"/>
           </a:p>
@@ -2722,7 +2725,7 @@
           <a:p>
             <a:fld id="{3D753955-9DDD-DB49-A632-67C4F7FA4A10}" type="datetimeFigureOut">
               <a:rPr lang="en-US" smtClean="0"/>
-              <a:t>11/5/12</a:t>
+              <a:t>11/6/12</a:t>
             </a:fld>
             <a:endParaRPr lang="en-US"/>
           </a:p>
@@ -3359,7 +3362,7 @@
             <a:graphicData uri="http://schemas.openxmlformats.org/presentationml/2006/ole">
               <mc:AlternateContent xmlns:mc="http://schemas.openxmlformats.org/markup-compatibility/2006">
                 <mc:Choice xmlns:v="urn:schemas-microsoft-com:vml" Requires="v">
-                  <p:oleObj spid="_x0000_s1036" name="Equation" r:id="rId3" imgW="215900" imgH="393700" progId="Equation.3">
+                  <p:oleObj spid="_x0000_s1039" name="Equation" r:id="rId3" imgW="215900" imgH="393700" progId="Equation.3">
                     <p:embed/>
                   </p:oleObj>
                 </mc:Choice>
@@ -5831,6 +5834,932 @@
     <p:extLst>
       <p:ext uri="{BB962C8B-B14F-4D97-AF65-F5344CB8AC3E}">
         <p14:creationId xmlns:p14="http://schemas.microsoft.com/office/powerpoint/2010/main" val="1389197330"/>
+      </p:ext>
+    </p:extLst>
+  </p:cSld>
+  <p:clrMapOvr>
+    <a:masterClrMapping/>
+  </p:clrMapOvr>
+</p:sld>
+</file>
+
+<file path=ppt/slides/slide4.xml><?xml version="1.0" encoding="utf-8"?>
+<p:sld xmlns:a="http://schemas.openxmlformats.org/drawingml/2006/main" xmlns:r="http://schemas.openxmlformats.org/officeDocument/2006/relationships" xmlns:p="http://schemas.openxmlformats.org/presentationml/2006/main">
+  <p:cSld>
+    <p:spTree>
+      <p:nvGrpSpPr>
+        <p:cNvPr id="1" name=""/>
+        <p:cNvGrpSpPr/>
+        <p:nvPr/>
+      </p:nvGrpSpPr>
+      <p:grpSpPr>
+        <a:xfrm>
+          <a:off x="0" y="0"/>
+          <a:ext cx="0" cy="0"/>
+          <a:chOff x="0" y="0"/>
+          <a:chExt cx="0" cy="0"/>
+        </a:xfrm>
+      </p:grpSpPr>
+      <p:grpSp>
+        <p:nvGrpSpPr>
+          <p:cNvPr id="14" name="Group 13"/>
+          <p:cNvGrpSpPr/>
+          <p:nvPr/>
+        </p:nvGrpSpPr>
+        <p:grpSpPr>
+          <a:xfrm>
+            <a:off x="1326106" y="1384472"/>
+            <a:ext cx="2338888" cy="2336640"/>
+            <a:chOff x="1326106" y="1384472"/>
+            <a:chExt cx="2338888" cy="2336640"/>
+          </a:xfrm>
+        </p:grpSpPr>
+        <p:grpSp>
+          <p:nvGrpSpPr>
+            <p:cNvPr id="5" name="Group 4"/>
+            <p:cNvGrpSpPr/>
+            <p:nvPr/>
+          </p:nvGrpSpPr>
+          <p:grpSpPr>
+            <a:xfrm>
+              <a:off x="1326106" y="1384472"/>
+              <a:ext cx="2338888" cy="2336640"/>
+              <a:chOff x="1613142" y="1384472"/>
+              <a:chExt cx="2338888" cy="2336640"/>
+            </a:xfrm>
+          </p:grpSpPr>
+          <p:sp>
+            <p:nvSpPr>
+              <p:cNvPr id="11" name="Rounded Rectangle 10"/>
+              <p:cNvSpPr>
+                <a:spLocks noChangeAspect="1"/>
+              </p:cNvSpPr>
+              <p:nvPr/>
+            </p:nvSpPr>
+            <p:spPr>
+              <a:xfrm>
+                <a:off x="1613142" y="1384472"/>
+                <a:ext cx="2338888" cy="2336640"/>
+              </a:xfrm>
+              <a:prstGeom prst="roundRect">
+                <a:avLst/>
+              </a:prstGeom>
+              <a:solidFill>
+                <a:schemeClr val="accent1"/>
+              </a:solidFill>
+              <a:effectLst/>
+            </p:spPr>
+            <p:style>
+              <a:lnRef idx="1">
+                <a:schemeClr val="accent1"/>
+              </a:lnRef>
+              <a:fillRef idx="3">
+                <a:schemeClr val="accent1"/>
+              </a:fillRef>
+              <a:effectRef idx="2">
+                <a:schemeClr val="accent1"/>
+              </a:effectRef>
+              <a:fontRef idx="minor">
+                <a:schemeClr val="lt1"/>
+              </a:fontRef>
+            </p:style>
+            <p:txBody>
+              <a:bodyPr rtlCol="0" anchor="ctr"/>
+              <a:lstStyle/>
+              <a:p>
+                <a:pPr algn="ctr"/>
+                <a:endParaRPr lang="en-US"/>
+              </a:p>
+            </p:txBody>
+          </p:sp>
+          <p:sp>
+            <p:nvSpPr>
+              <p:cNvPr id="12" name="Rounded Rectangle 11"/>
+              <p:cNvSpPr>
+                <a:spLocks noChangeAspect="1"/>
+              </p:cNvSpPr>
+              <p:nvPr/>
+            </p:nvSpPr>
+            <p:spPr>
+              <a:xfrm>
+                <a:off x="1759590" y="1530776"/>
+                <a:ext cx="2045992" cy="2044032"/>
+              </a:xfrm>
+              <a:prstGeom prst="roundRect">
+                <a:avLst/>
+              </a:prstGeom>
+              <a:solidFill>
+                <a:schemeClr val="bg1"/>
+              </a:solidFill>
+              <a:effectLst/>
+            </p:spPr>
+            <p:style>
+              <a:lnRef idx="1">
+                <a:schemeClr val="accent1"/>
+              </a:lnRef>
+              <a:fillRef idx="3">
+                <a:schemeClr val="accent1"/>
+              </a:fillRef>
+              <a:effectRef idx="2">
+                <a:schemeClr val="accent1"/>
+              </a:effectRef>
+              <a:fontRef idx="minor">
+                <a:schemeClr val="lt1"/>
+              </a:fontRef>
+            </p:style>
+            <p:txBody>
+              <a:bodyPr rtlCol="0" anchor="ctr"/>
+              <a:lstStyle/>
+              <a:p>
+                <a:pPr algn="ctr"/>
+                <a:endParaRPr lang="en-US"/>
+              </a:p>
+            </p:txBody>
+          </p:sp>
+        </p:grpSp>
+        <p:grpSp>
+          <p:nvGrpSpPr>
+            <p:cNvPr id="13" name="Group 12"/>
+            <p:cNvGrpSpPr/>
+            <p:nvPr/>
+          </p:nvGrpSpPr>
+          <p:grpSpPr>
+            <a:xfrm>
+              <a:off x="1924051" y="1943232"/>
+              <a:ext cx="1142999" cy="1333421"/>
+              <a:chOff x="1924051" y="1886082"/>
+              <a:chExt cx="1142999" cy="1333421"/>
+            </a:xfrm>
+          </p:grpSpPr>
+          <p:grpSp>
+            <p:nvGrpSpPr>
+              <p:cNvPr id="7" name="Group 6"/>
+              <p:cNvGrpSpPr/>
+              <p:nvPr/>
+            </p:nvGrpSpPr>
+            <p:grpSpPr>
+              <a:xfrm>
+                <a:off x="1924051" y="1886082"/>
+                <a:ext cx="1142999" cy="1333421"/>
+                <a:chOff x="1771650" y="1828800"/>
+                <a:chExt cx="1142999" cy="1333421"/>
+              </a:xfrm>
+            </p:grpSpPr>
+            <p:sp>
+              <p:nvSpPr>
+                <p:cNvPr id="4" name="Rectangle 3"/>
+                <p:cNvSpPr/>
+                <p:nvPr/>
+              </p:nvSpPr>
+              <p:spPr>
+                <a:xfrm rot="18900000">
+                  <a:off x="2736849" y="2603421"/>
+                  <a:ext cx="177800" cy="558800"/>
+                </a:xfrm>
+                <a:prstGeom prst="rect">
+                  <a:avLst/>
+                </a:prstGeom>
+                <a:solidFill>
+                  <a:srgbClr val="4F81BD"/>
+                </a:solidFill>
+                <a:ln>
+                  <a:noFill/>
+                </a:ln>
+                <a:effectLst/>
+              </p:spPr>
+              <p:style>
+                <a:lnRef idx="1">
+                  <a:schemeClr val="accent1"/>
+                </a:lnRef>
+                <a:fillRef idx="3">
+                  <a:schemeClr val="accent1"/>
+                </a:fillRef>
+                <a:effectRef idx="2">
+                  <a:schemeClr val="accent1"/>
+                </a:effectRef>
+                <a:fontRef idx="minor">
+                  <a:schemeClr val="lt1"/>
+                </a:fontRef>
+              </p:style>
+              <p:txBody>
+                <a:bodyPr rtlCol="0" anchor="ctr"/>
+                <a:lstStyle/>
+                <a:p>
+                  <a:pPr algn="ctr"/>
+                  <a:endParaRPr lang="en-US"/>
+                </a:p>
+              </p:txBody>
+            </p:sp>
+            <p:sp>
+              <p:nvSpPr>
+                <p:cNvPr id="2" name="Oval 1"/>
+                <p:cNvSpPr/>
+                <p:nvPr/>
+              </p:nvSpPr>
+              <p:spPr>
+                <a:xfrm>
+                  <a:off x="1771650" y="1828800"/>
+                  <a:ext cx="1035050" cy="1035050"/>
+                </a:xfrm>
+                <a:prstGeom prst="ellipse">
+                  <a:avLst/>
+                </a:prstGeom>
+                <a:solidFill>
+                  <a:schemeClr val="accent1"/>
+                </a:solidFill>
+                <a:ln>
+                  <a:noFill/>
+                </a:ln>
+                <a:effectLst/>
+              </p:spPr>
+              <p:style>
+                <a:lnRef idx="1">
+                  <a:schemeClr val="accent1"/>
+                </a:lnRef>
+                <a:fillRef idx="3">
+                  <a:schemeClr val="accent1"/>
+                </a:fillRef>
+                <a:effectRef idx="2">
+                  <a:schemeClr val="accent1"/>
+                </a:effectRef>
+                <a:fontRef idx="minor">
+                  <a:schemeClr val="lt1"/>
+                </a:fontRef>
+              </p:style>
+              <p:txBody>
+                <a:bodyPr rtlCol="0" anchor="ctr"/>
+                <a:lstStyle/>
+                <a:p>
+                  <a:pPr algn="ctr"/>
+                  <a:endParaRPr lang="en-US"/>
+                </a:p>
+              </p:txBody>
+            </p:sp>
+            <p:sp>
+              <p:nvSpPr>
+                <p:cNvPr id="18" name="Oval 17"/>
+                <p:cNvSpPr>
+                  <a:spLocks/>
+                </p:cNvSpPr>
+                <p:nvPr/>
+              </p:nvSpPr>
+              <p:spPr>
+                <a:xfrm>
+                  <a:off x="1880302" y="1938098"/>
+                  <a:ext cx="817747" cy="816454"/>
+                </a:xfrm>
+                <a:prstGeom prst="ellipse">
+                  <a:avLst/>
+                </a:prstGeom>
+                <a:solidFill>
+                  <a:schemeClr val="bg1"/>
+                </a:solidFill>
+                <a:ln>
+                  <a:noFill/>
+                </a:ln>
+                <a:effectLst/>
+              </p:spPr>
+              <p:style>
+                <a:lnRef idx="1">
+                  <a:schemeClr val="accent1"/>
+                </a:lnRef>
+                <a:fillRef idx="3">
+                  <a:schemeClr val="accent1"/>
+                </a:fillRef>
+                <a:effectRef idx="2">
+                  <a:schemeClr val="accent1"/>
+                </a:effectRef>
+                <a:fontRef idx="minor">
+                  <a:schemeClr val="lt1"/>
+                </a:fontRef>
+              </p:style>
+              <p:txBody>
+                <a:bodyPr rtlCol="0" anchor="ctr"/>
+                <a:lstStyle/>
+                <a:p>
+                  <a:pPr algn="ctr"/>
+                  <a:endParaRPr lang="en-US"/>
+                </a:p>
+              </p:txBody>
+            </p:sp>
+          </p:grpSp>
+          <p:sp>
+            <p:nvSpPr>
+              <p:cNvPr id="9" name="Minus 8"/>
+              <p:cNvSpPr/>
+              <p:nvPr/>
+            </p:nvSpPr>
+            <p:spPr>
+              <a:xfrm>
+                <a:off x="2122092" y="2088485"/>
+                <a:ext cx="633730" cy="635640"/>
+              </a:xfrm>
+              <a:prstGeom prst="mathMinus">
+                <a:avLst>
+                  <a:gd name="adj1" fmla="val 11532"/>
+                </a:avLst>
+              </a:prstGeom>
+              <a:solidFill>
+                <a:srgbClr val="000000"/>
+              </a:solidFill>
+              <a:ln>
+                <a:solidFill>
+                  <a:srgbClr val="000000"/>
+                </a:solidFill>
+              </a:ln>
+              <a:effectLst/>
+            </p:spPr>
+            <p:style>
+              <a:lnRef idx="1">
+                <a:schemeClr val="accent1"/>
+              </a:lnRef>
+              <a:fillRef idx="3">
+                <a:schemeClr val="accent1"/>
+              </a:fillRef>
+              <a:effectRef idx="2">
+                <a:schemeClr val="accent1"/>
+              </a:effectRef>
+              <a:fontRef idx="minor">
+                <a:schemeClr val="lt1"/>
+              </a:fontRef>
+            </p:style>
+            <p:txBody>
+              <a:bodyPr rtlCol="0" anchor="ctr"/>
+              <a:lstStyle/>
+              <a:p>
+                <a:pPr algn="ctr"/>
+                <a:endParaRPr lang="en-US"/>
+              </a:p>
+            </p:txBody>
+          </p:sp>
+        </p:grpSp>
+      </p:grpSp>
+    </p:spTree>
+    <p:extLst>
+      <p:ext uri="{BB962C8B-B14F-4D97-AF65-F5344CB8AC3E}">
+        <p14:creationId xmlns:p14="http://schemas.microsoft.com/office/powerpoint/2010/main" val="4100739681"/>
+      </p:ext>
+    </p:extLst>
+  </p:cSld>
+  <p:clrMapOvr>
+    <a:masterClrMapping/>
+  </p:clrMapOvr>
+</p:sld>
+</file>
+
+<file path=ppt/slides/slide5.xml><?xml version="1.0" encoding="utf-8"?>
+<p:sld xmlns:a="http://schemas.openxmlformats.org/drawingml/2006/main" xmlns:r="http://schemas.openxmlformats.org/officeDocument/2006/relationships" xmlns:p="http://schemas.openxmlformats.org/presentationml/2006/main">
+  <p:cSld>
+    <p:spTree>
+      <p:nvGrpSpPr>
+        <p:cNvPr id="1" name=""/>
+        <p:cNvGrpSpPr/>
+        <p:nvPr/>
+      </p:nvGrpSpPr>
+      <p:grpSpPr>
+        <a:xfrm>
+          <a:off x="0" y="0"/>
+          <a:ext cx="0" cy="0"/>
+          <a:chOff x="0" y="0"/>
+          <a:chExt cx="0" cy="0"/>
+        </a:xfrm>
+      </p:grpSpPr>
+      <p:grpSp>
+        <p:nvGrpSpPr>
+          <p:cNvPr id="9" name="Group 8"/>
+          <p:cNvGrpSpPr/>
+          <p:nvPr/>
+        </p:nvGrpSpPr>
+        <p:grpSpPr>
+          <a:xfrm>
+            <a:off x="1326106" y="1384472"/>
+            <a:ext cx="2338888" cy="2336640"/>
+            <a:chOff x="1326106" y="1384472"/>
+            <a:chExt cx="2338888" cy="2336640"/>
+          </a:xfrm>
+        </p:grpSpPr>
+        <p:grpSp>
+          <p:nvGrpSpPr>
+            <p:cNvPr id="5" name="Group 4"/>
+            <p:cNvGrpSpPr/>
+            <p:nvPr/>
+          </p:nvGrpSpPr>
+          <p:grpSpPr>
+            <a:xfrm>
+              <a:off x="1326106" y="1384472"/>
+              <a:ext cx="2338888" cy="2336640"/>
+              <a:chOff x="1613142" y="1384472"/>
+              <a:chExt cx="2338888" cy="2336640"/>
+            </a:xfrm>
+          </p:grpSpPr>
+          <p:sp>
+            <p:nvSpPr>
+              <p:cNvPr id="11" name="Rounded Rectangle 10"/>
+              <p:cNvSpPr>
+                <a:spLocks noChangeAspect="1"/>
+              </p:cNvSpPr>
+              <p:nvPr/>
+            </p:nvSpPr>
+            <p:spPr>
+              <a:xfrm>
+                <a:off x="1613142" y="1384472"/>
+                <a:ext cx="2338888" cy="2336640"/>
+              </a:xfrm>
+              <a:prstGeom prst="roundRect">
+                <a:avLst/>
+              </a:prstGeom>
+              <a:solidFill>
+                <a:schemeClr val="accent1"/>
+              </a:solidFill>
+              <a:effectLst/>
+            </p:spPr>
+            <p:style>
+              <a:lnRef idx="1">
+                <a:schemeClr val="accent1"/>
+              </a:lnRef>
+              <a:fillRef idx="3">
+                <a:schemeClr val="accent1"/>
+              </a:fillRef>
+              <a:effectRef idx="2">
+                <a:schemeClr val="accent1"/>
+              </a:effectRef>
+              <a:fontRef idx="minor">
+                <a:schemeClr val="lt1"/>
+              </a:fontRef>
+            </p:style>
+            <p:txBody>
+              <a:bodyPr rtlCol="0" anchor="ctr"/>
+              <a:lstStyle/>
+              <a:p>
+                <a:pPr algn="ctr"/>
+                <a:endParaRPr lang="en-US"/>
+              </a:p>
+            </p:txBody>
+          </p:sp>
+          <p:sp>
+            <p:nvSpPr>
+              <p:cNvPr id="12" name="Rounded Rectangle 11"/>
+              <p:cNvSpPr>
+                <a:spLocks noChangeAspect="1"/>
+              </p:cNvSpPr>
+              <p:nvPr/>
+            </p:nvSpPr>
+            <p:spPr>
+              <a:xfrm>
+                <a:off x="1759590" y="1530776"/>
+                <a:ext cx="2045992" cy="2044032"/>
+              </a:xfrm>
+              <a:prstGeom prst="roundRect">
+                <a:avLst/>
+              </a:prstGeom>
+              <a:solidFill>
+                <a:schemeClr val="bg1"/>
+              </a:solidFill>
+              <a:effectLst/>
+            </p:spPr>
+            <p:style>
+              <a:lnRef idx="1">
+                <a:schemeClr val="accent1"/>
+              </a:lnRef>
+              <a:fillRef idx="3">
+                <a:schemeClr val="accent1"/>
+              </a:fillRef>
+              <a:effectRef idx="2">
+                <a:schemeClr val="accent1"/>
+              </a:effectRef>
+              <a:fontRef idx="minor">
+                <a:schemeClr val="lt1"/>
+              </a:fontRef>
+            </p:style>
+            <p:txBody>
+              <a:bodyPr rtlCol="0" anchor="ctr"/>
+              <a:lstStyle/>
+              <a:p>
+                <a:pPr algn="ctr"/>
+                <a:endParaRPr lang="en-US"/>
+              </a:p>
+            </p:txBody>
+          </p:sp>
+        </p:grpSp>
+        <p:grpSp>
+          <p:nvGrpSpPr>
+            <p:cNvPr id="8" name="Group 7"/>
+            <p:cNvGrpSpPr/>
+            <p:nvPr/>
+          </p:nvGrpSpPr>
+          <p:grpSpPr>
+            <a:xfrm>
+              <a:off x="1924051" y="1943232"/>
+              <a:ext cx="1142999" cy="1333421"/>
+              <a:chOff x="1924051" y="1886082"/>
+              <a:chExt cx="1142999" cy="1333421"/>
+            </a:xfrm>
+          </p:grpSpPr>
+          <p:grpSp>
+            <p:nvGrpSpPr>
+              <p:cNvPr id="7" name="Group 6"/>
+              <p:cNvGrpSpPr/>
+              <p:nvPr/>
+            </p:nvGrpSpPr>
+            <p:grpSpPr>
+              <a:xfrm>
+                <a:off x="1924051" y="1886082"/>
+                <a:ext cx="1142999" cy="1333421"/>
+                <a:chOff x="1771650" y="1828800"/>
+                <a:chExt cx="1142999" cy="1333421"/>
+              </a:xfrm>
+            </p:grpSpPr>
+            <p:sp>
+              <p:nvSpPr>
+                <p:cNvPr id="4" name="Rectangle 3"/>
+                <p:cNvSpPr/>
+                <p:nvPr/>
+              </p:nvSpPr>
+              <p:spPr>
+                <a:xfrm rot="18900000">
+                  <a:off x="2736849" y="2603421"/>
+                  <a:ext cx="177800" cy="558800"/>
+                </a:xfrm>
+                <a:prstGeom prst="rect">
+                  <a:avLst/>
+                </a:prstGeom>
+                <a:solidFill>
+                  <a:srgbClr val="4F81BD"/>
+                </a:solidFill>
+                <a:ln>
+                  <a:noFill/>
+                </a:ln>
+                <a:effectLst/>
+              </p:spPr>
+              <p:style>
+                <a:lnRef idx="1">
+                  <a:schemeClr val="accent1"/>
+                </a:lnRef>
+                <a:fillRef idx="3">
+                  <a:schemeClr val="accent1"/>
+                </a:fillRef>
+                <a:effectRef idx="2">
+                  <a:schemeClr val="accent1"/>
+                </a:effectRef>
+                <a:fontRef idx="minor">
+                  <a:schemeClr val="lt1"/>
+                </a:fontRef>
+              </p:style>
+              <p:txBody>
+                <a:bodyPr rtlCol="0" anchor="ctr"/>
+                <a:lstStyle/>
+                <a:p>
+                  <a:pPr algn="ctr"/>
+                  <a:endParaRPr lang="en-US"/>
+                </a:p>
+              </p:txBody>
+            </p:sp>
+            <p:sp>
+              <p:nvSpPr>
+                <p:cNvPr id="2" name="Oval 1"/>
+                <p:cNvSpPr/>
+                <p:nvPr/>
+              </p:nvSpPr>
+              <p:spPr>
+                <a:xfrm>
+                  <a:off x="1771650" y="1828800"/>
+                  <a:ext cx="1035050" cy="1035050"/>
+                </a:xfrm>
+                <a:prstGeom prst="ellipse">
+                  <a:avLst/>
+                </a:prstGeom>
+                <a:solidFill>
+                  <a:schemeClr val="accent1"/>
+                </a:solidFill>
+                <a:ln>
+                  <a:noFill/>
+                </a:ln>
+                <a:effectLst/>
+              </p:spPr>
+              <p:style>
+                <a:lnRef idx="1">
+                  <a:schemeClr val="accent1"/>
+                </a:lnRef>
+                <a:fillRef idx="3">
+                  <a:schemeClr val="accent1"/>
+                </a:fillRef>
+                <a:effectRef idx="2">
+                  <a:schemeClr val="accent1"/>
+                </a:effectRef>
+                <a:fontRef idx="minor">
+                  <a:schemeClr val="lt1"/>
+                </a:fontRef>
+              </p:style>
+              <p:txBody>
+                <a:bodyPr rtlCol="0" anchor="ctr"/>
+                <a:lstStyle/>
+                <a:p>
+                  <a:pPr algn="ctr"/>
+                  <a:endParaRPr lang="en-US"/>
+                </a:p>
+              </p:txBody>
+            </p:sp>
+            <p:sp>
+              <p:nvSpPr>
+                <p:cNvPr id="18" name="Oval 17"/>
+                <p:cNvSpPr>
+                  <a:spLocks/>
+                </p:cNvSpPr>
+                <p:nvPr/>
+              </p:nvSpPr>
+              <p:spPr>
+                <a:xfrm>
+                  <a:off x="1880302" y="1938098"/>
+                  <a:ext cx="817747" cy="816454"/>
+                </a:xfrm>
+                <a:prstGeom prst="ellipse">
+                  <a:avLst/>
+                </a:prstGeom>
+                <a:solidFill>
+                  <a:schemeClr val="bg1"/>
+                </a:solidFill>
+                <a:ln>
+                  <a:noFill/>
+                </a:ln>
+                <a:effectLst/>
+              </p:spPr>
+              <p:style>
+                <a:lnRef idx="1">
+                  <a:schemeClr val="accent1"/>
+                </a:lnRef>
+                <a:fillRef idx="3">
+                  <a:schemeClr val="accent1"/>
+                </a:fillRef>
+                <a:effectRef idx="2">
+                  <a:schemeClr val="accent1"/>
+                </a:effectRef>
+                <a:fontRef idx="minor">
+                  <a:schemeClr val="lt1"/>
+                </a:fontRef>
+              </p:style>
+              <p:txBody>
+                <a:bodyPr rtlCol="0" anchor="ctr"/>
+                <a:lstStyle/>
+                <a:p>
+                  <a:pPr algn="ctr"/>
+                  <a:endParaRPr lang="en-US"/>
+                </a:p>
+              </p:txBody>
+            </p:sp>
+          </p:grpSp>
+          <p:sp>
+            <p:nvSpPr>
+              <p:cNvPr id="3" name="Plus 2"/>
+              <p:cNvSpPr/>
+              <p:nvPr/>
+            </p:nvSpPr>
+            <p:spPr>
+              <a:xfrm>
+                <a:off x="2120900" y="2085849"/>
+                <a:ext cx="639064" cy="631926"/>
+              </a:xfrm>
+              <a:prstGeom prst="mathPlus">
+                <a:avLst>
+                  <a:gd name="adj1" fmla="val 9452"/>
+                </a:avLst>
+              </a:prstGeom>
+              <a:solidFill>
+                <a:schemeClr val="tx1"/>
+              </a:solidFill>
+              <a:ln>
+                <a:solidFill>
+                  <a:schemeClr val="tx1"/>
+                </a:solidFill>
+              </a:ln>
+              <a:effectLst/>
+            </p:spPr>
+            <p:style>
+              <a:lnRef idx="1">
+                <a:schemeClr val="accent1"/>
+              </a:lnRef>
+              <a:fillRef idx="3">
+                <a:schemeClr val="accent1"/>
+              </a:fillRef>
+              <a:effectRef idx="2">
+                <a:schemeClr val="accent1"/>
+              </a:effectRef>
+              <a:fontRef idx="minor">
+                <a:schemeClr val="lt1"/>
+              </a:fontRef>
+            </p:style>
+            <p:txBody>
+              <a:bodyPr rtlCol="0" anchor="ctr"/>
+              <a:lstStyle/>
+              <a:p>
+                <a:pPr algn="ctr"/>
+                <a:endParaRPr lang="en-US"/>
+              </a:p>
+            </p:txBody>
+          </p:sp>
+        </p:grpSp>
+      </p:grpSp>
+    </p:spTree>
+    <p:extLst>
+      <p:ext uri="{BB962C8B-B14F-4D97-AF65-F5344CB8AC3E}">
+        <p14:creationId xmlns:p14="http://schemas.microsoft.com/office/powerpoint/2010/main" val="1437430794"/>
+      </p:ext>
+    </p:extLst>
+  </p:cSld>
+  <p:clrMapOvr>
+    <a:masterClrMapping/>
+  </p:clrMapOvr>
+</p:sld>
+</file>
+
+<file path=ppt/slides/slide6.xml><?xml version="1.0" encoding="utf-8"?>
+<p:sld xmlns:a="http://schemas.openxmlformats.org/drawingml/2006/main" xmlns:r="http://schemas.openxmlformats.org/officeDocument/2006/relationships" xmlns:p="http://schemas.openxmlformats.org/presentationml/2006/main">
+  <p:cSld>
+    <p:spTree>
+      <p:nvGrpSpPr>
+        <p:cNvPr id="1" name=""/>
+        <p:cNvGrpSpPr/>
+        <p:nvPr/>
+      </p:nvGrpSpPr>
+      <p:grpSpPr>
+        <a:xfrm>
+          <a:off x="0" y="0"/>
+          <a:ext cx="0" cy="0"/>
+          <a:chOff x="0" y="0"/>
+          <a:chExt cx="0" cy="0"/>
+        </a:xfrm>
+      </p:grpSpPr>
+      <p:grpSp>
+        <p:nvGrpSpPr>
+          <p:cNvPr id="10" name="Group 9"/>
+          <p:cNvGrpSpPr/>
+          <p:nvPr/>
+        </p:nvGrpSpPr>
+        <p:grpSpPr>
+          <a:xfrm>
+            <a:off x="1326106" y="1384472"/>
+            <a:ext cx="2338888" cy="2336640"/>
+            <a:chOff x="1326106" y="1384472"/>
+            <a:chExt cx="2338888" cy="2336640"/>
+          </a:xfrm>
+        </p:grpSpPr>
+        <p:grpSp>
+          <p:nvGrpSpPr>
+            <p:cNvPr id="5" name="Group 4"/>
+            <p:cNvGrpSpPr/>
+            <p:nvPr/>
+          </p:nvGrpSpPr>
+          <p:grpSpPr>
+            <a:xfrm>
+              <a:off x="1326106" y="1384472"/>
+              <a:ext cx="2338888" cy="2336640"/>
+              <a:chOff x="1613142" y="1384472"/>
+              <a:chExt cx="2338888" cy="2336640"/>
+            </a:xfrm>
+          </p:grpSpPr>
+          <p:sp>
+            <p:nvSpPr>
+              <p:cNvPr id="11" name="Rounded Rectangle 10"/>
+              <p:cNvSpPr>
+                <a:spLocks noChangeAspect="1"/>
+              </p:cNvSpPr>
+              <p:nvPr/>
+            </p:nvSpPr>
+            <p:spPr>
+              <a:xfrm>
+                <a:off x="1613142" y="1384472"/>
+                <a:ext cx="2338888" cy="2336640"/>
+              </a:xfrm>
+              <a:prstGeom prst="roundRect">
+                <a:avLst/>
+              </a:prstGeom>
+              <a:solidFill>
+                <a:schemeClr val="accent1"/>
+              </a:solidFill>
+              <a:effectLst/>
+            </p:spPr>
+            <p:style>
+              <a:lnRef idx="1">
+                <a:schemeClr val="accent1"/>
+              </a:lnRef>
+              <a:fillRef idx="3">
+                <a:schemeClr val="accent1"/>
+              </a:fillRef>
+              <a:effectRef idx="2">
+                <a:schemeClr val="accent1"/>
+              </a:effectRef>
+              <a:fontRef idx="minor">
+                <a:schemeClr val="lt1"/>
+              </a:fontRef>
+            </p:style>
+            <p:txBody>
+              <a:bodyPr rtlCol="0" anchor="ctr"/>
+              <a:lstStyle/>
+              <a:p>
+                <a:pPr algn="ctr"/>
+                <a:endParaRPr lang="en-US"/>
+              </a:p>
+            </p:txBody>
+          </p:sp>
+          <p:sp>
+            <p:nvSpPr>
+              <p:cNvPr id="12" name="Rounded Rectangle 11"/>
+              <p:cNvSpPr>
+                <a:spLocks noChangeAspect="1"/>
+              </p:cNvSpPr>
+              <p:nvPr/>
+            </p:nvSpPr>
+            <p:spPr>
+              <a:xfrm>
+                <a:off x="1759590" y="1530776"/>
+                <a:ext cx="2045992" cy="2044032"/>
+              </a:xfrm>
+              <a:prstGeom prst="roundRect">
+                <a:avLst/>
+              </a:prstGeom>
+              <a:solidFill>
+                <a:schemeClr val="bg1"/>
+              </a:solidFill>
+              <a:effectLst/>
+            </p:spPr>
+            <p:style>
+              <a:lnRef idx="1">
+                <a:schemeClr val="accent1"/>
+              </a:lnRef>
+              <a:fillRef idx="3">
+                <a:schemeClr val="accent1"/>
+              </a:fillRef>
+              <a:effectRef idx="2">
+                <a:schemeClr val="accent1"/>
+              </a:effectRef>
+              <a:fontRef idx="minor">
+                <a:schemeClr val="lt1"/>
+              </a:fontRef>
+            </p:style>
+            <p:txBody>
+              <a:bodyPr rtlCol="0" anchor="ctr"/>
+              <a:lstStyle/>
+              <a:p>
+                <a:pPr algn="ctr"/>
+                <a:endParaRPr lang="en-US"/>
+              </a:p>
+            </p:txBody>
+          </p:sp>
+        </p:grpSp>
+        <p:sp>
+          <p:nvSpPr>
+            <p:cNvPr id="6" name="Quad Arrow 5"/>
+            <p:cNvSpPr/>
+            <p:nvPr/>
+          </p:nvSpPr>
+          <p:spPr>
+            <a:xfrm>
+              <a:off x="1612900" y="1629080"/>
+              <a:ext cx="1765300" cy="1847424"/>
+            </a:xfrm>
+            <a:prstGeom prst="quadArrow">
+              <a:avLst>
+                <a:gd name="adj1" fmla="val 4219"/>
+                <a:gd name="adj2" fmla="val 7517"/>
+                <a:gd name="adj3" fmla="val 14605"/>
+              </a:avLst>
+            </a:prstGeom>
+            <a:solidFill>
+              <a:srgbClr val="000000"/>
+            </a:solidFill>
+            <a:ln>
+              <a:solidFill>
+                <a:srgbClr val="000000"/>
+              </a:solidFill>
+            </a:ln>
+          </p:spPr>
+          <p:style>
+            <a:lnRef idx="1">
+              <a:schemeClr val="accent1"/>
+            </a:lnRef>
+            <a:fillRef idx="3">
+              <a:schemeClr val="accent1"/>
+            </a:fillRef>
+            <a:effectRef idx="2">
+              <a:schemeClr val="accent1"/>
+            </a:effectRef>
+            <a:fontRef idx="minor">
+              <a:schemeClr val="lt1"/>
+            </a:fontRef>
+          </p:style>
+          <p:txBody>
+            <a:bodyPr rtlCol="0" anchor="ctr"/>
+            <a:lstStyle/>
+            <a:p>
+              <a:pPr algn="ctr"/>
+              <a:endParaRPr lang="en-US"/>
+            </a:p>
+          </p:txBody>
+        </p:sp>
+      </p:grpSp>
+    </p:spTree>
+    <p:extLst>
+      <p:ext uri="{BB962C8B-B14F-4D97-AF65-F5344CB8AC3E}">
+        <p14:creationId xmlns:p14="http://schemas.microsoft.com/office/powerpoint/2010/main" val="3223716189"/>
       </p:ext>
     </p:extLst>
   </p:cSld>

</xml_diff>